<commit_message>
Zmieniono adress do pobeirania kodu.
</commit_message>
<xml_diff>
--- a/docs/Workshops_BS01.pptx
+++ b/docs/Workshops_BS01.pptx
@@ -143,7 +143,7 @@
   </p:defaultTextStyle>
   <p:extLst>
     <p:ext uri="{EFAFB233-063F-42B5-8137-9DF3F51BA10A}">
-      <p15:sldGuideLst xmlns:p15="http://schemas.microsoft.com/office/powerpoint/2012/main" xmlns="">
+      <p15:sldGuideLst xmlns="" xmlns:p15="http://schemas.microsoft.com/office/powerpoint/2012/main">
         <p15:guide id="1" orient="horz" pos="1620">
           <p15:clr>
             <a:srgbClr val="A4A3A4"/>
@@ -197,7 +197,7 @@
       </p15:sldGuideLst>
     </p:ext>
     <p:ext uri="{2D200454-40CA-4A62-9FC3-DE9A4176ACB9}">
-      <p15:notesGuideLst xmlns:p15="http://schemas.microsoft.com/office/powerpoint/2012/main" xmlns="">
+      <p15:notesGuideLst xmlns="" xmlns:p15="http://schemas.microsoft.com/office/powerpoint/2012/main">
         <p15:guide id="1" orient="horz" pos="2880">
           <p15:clr>
             <a:srgbClr val="A4A3A4"/>
@@ -909,7 +909,7 @@
   </p:clrMapOvr>
   <p:extLst>
     <p:ext uri="{DCECCB84-F9BA-43D5-87BE-67443E8EF086}">
-      <p15:sldGuideLst xmlns:p15="http://schemas.microsoft.com/office/powerpoint/2012/main" xmlns="">
+      <p15:sldGuideLst xmlns="" xmlns:p15="http://schemas.microsoft.com/office/powerpoint/2012/main">
         <p15:guide id="1" orient="horz" pos="1620" userDrawn="1">
           <p15:clr>
             <a:srgbClr val="FBAE40"/>
@@ -1284,7 +1284,7 @@
   </p:timing>
   <p:extLst mod="1">
     <p:ext uri="{DCECCB84-F9BA-43D5-87BE-67443E8EF086}">
-      <p15:sldGuideLst xmlns:p15="http://schemas.microsoft.com/office/powerpoint/2012/main" xmlns="">
+      <p15:sldGuideLst xmlns="" xmlns:p15="http://schemas.microsoft.com/office/powerpoint/2012/main">
         <p15:guide id="1" orient="horz" pos="1620" userDrawn="1">
           <p15:clr>
             <a:srgbClr val="FBAE40"/>
@@ -1675,7 +1675,7 @@
   </p:timing>
   <p:extLst mod="1">
     <p:ext uri="{DCECCB84-F9BA-43D5-87BE-67443E8EF086}">
-      <p15:sldGuideLst xmlns:p15="http://schemas.microsoft.com/office/powerpoint/2012/main" xmlns="">
+      <p15:sldGuideLst xmlns="" xmlns:p15="http://schemas.microsoft.com/office/powerpoint/2012/main">
         <p15:guide id="1" orient="horz" pos="1620">
           <p15:clr>
             <a:srgbClr val="FBAE40"/>
@@ -1794,7 +1794,7 @@
   </p:clrMapOvr>
   <p:extLst mod="1">
     <p:ext uri="{DCECCB84-F9BA-43D5-87BE-67443E8EF086}">
-      <p15:sldGuideLst xmlns:p15="http://schemas.microsoft.com/office/powerpoint/2012/main" xmlns="">
+      <p15:sldGuideLst xmlns="" xmlns:p15="http://schemas.microsoft.com/office/powerpoint/2012/main">
         <p15:guide id="1" orient="horz" pos="1620" userDrawn="1">
           <p15:clr>
             <a:srgbClr val="FBAE40"/>
@@ -2169,7 +2169,7 @@
   </p:timing>
   <p:extLst mod="1">
     <p:ext uri="{DCECCB84-F9BA-43D5-87BE-67443E8EF086}">
-      <p15:sldGuideLst xmlns:p15="http://schemas.microsoft.com/office/powerpoint/2012/main" xmlns="">
+      <p15:sldGuideLst xmlns="" xmlns:p15="http://schemas.microsoft.com/office/powerpoint/2012/main">
         <p15:guide id="1" orient="horz" pos="1620" userDrawn="1">
           <p15:clr>
             <a:srgbClr val="FBAE40"/>
@@ -2560,7 +2560,7 @@
   </p:timing>
   <p:extLst mod="1">
     <p:ext uri="{DCECCB84-F9BA-43D5-87BE-67443E8EF086}">
-      <p15:sldGuideLst xmlns:p15="http://schemas.microsoft.com/office/powerpoint/2012/main" xmlns="">
+      <p15:sldGuideLst xmlns="" xmlns:p15="http://schemas.microsoft.com/office/powerpoint/2012/main">
         <p15:guide id="1" orient="horz" pos="1620">
           <p15:clr>
             <a:srgbClr val="FBAE40"/>
@@ -3083,7 +3083,7 @@
   </p:txStyles>
   <p:extLst>
     <p:ext uri="{27BBF7A9-308A-43DC-89C8-2F10F3537804}">
-      <p15:sldGuideLst xmlns:p15="http://schemas.microsoft.com/office/powerpoint/2012/main" xmlns="">
+      <p15:sldGuideLst xmlns="" xmlns:p15="http://schemas.microsoft.com/office/powerpoint/2012/main">
         <p15:guide id="1" orient="horz" pos="1620" userDrawn="1">
           <p15:clr>
             <a:srgbClr val="F26B43"/>
@@ -4342,7 +4342,7 @@
         <p:spPr>
           <a:xfrm>
             <a:off x="184924" y="4083918"/>
-            <a:ext cx="6455613" cy="646331"/>
+            <a:ext cx="7340471" cy="646331"/>
           </a:xfrm>
           <a:prstGeom prst="rect">
             <a:avLst/>
@@ -4368,16 +4368,9 @@
           <a:p>
             <a:r>
               <a:rPr lang="pl-PL" dirty="0"/>
-              <a:t>	</a:t>
-            </a:r>
-            <a:r>
-              <a:rPr lang="pl-PL" dirty="0" smtClean="0"/>
-              <a:t>https</a:t>
-            </a:r>
-            <a:r>
-              <a:rPr lang="pl-PL" dirty="0"/>
-              <a:t>://github.com/ppmazurGU/workshops_Bialystok</a:t>
-            </a:r>
+              <a:t>https://github.com/ppmazurGU/workshops_Bialystok/tree/Spotkanie_1</a:t>
+            </a:r>
+            <a:endParaRPr lang="pl-PL" dirty="0"/>
           </a:p>
         </p:txBody>
       </p:sp>
@@ -8731,7 +8724,7 @@
   <a:extraClrSchemeLst/>
   <a:extLst>
     <a:ext uri="{05A4C25C-085E-4340-85A3-A5531E510DB2}">
-      <thm15:themeFamily xmlns:thm15="http://schemas.microsoft.com/office/thememl/2012/main" xmlns="" name="Office Theme" id="{62F939B6-93AF-4DB8-9C6B-D6C7DFDC589F}" vid="{4A3C46E8-61CC-4603-A589-7422A47A8E4A}"/>
+      <thm15:themeFamily xmlns="" xmlns:thm15="http://schemas.microsoft.com/office/thememl/2012/main" name="Office Theme" id="{62F939B6-93AF-4DB8-9C6B-D6C7DFDC589F}" vid="{4A3C46E8-61CC-4603-A589-7422A47A8E4A}"/>
     </a:ext>
   </a:extLst>
 </a:theme>
@@ -9308,21 +9301,6 @@
 </file>
 
 <file path=customXml/item1.xml><?xml version="1.0" encoding="utf-8"?>
-<p:properties xmlns:p="http://schemas.microsoft.com/office/2006/metadata/properties" xmlns:xsi="http://www.w3.org/2001/XMLSchema-instance" xmlns:pc="http://schemas.microsoft.com/office/infopath/2007/PartnerControls">
-  <documentManagement/>
-</p:properties>
-</file>
-
-<file path=customXml/item2.xml><?xml version="1.0" encoding="utf-8"?>
-<?mso-contentType ?>
-<FormTemplates xmlns="http://schemas.microsoft.com/sharepoint/v3/contenttype/forms">
-  <Display>DocumentLibraryForm</Display>
-  <Edit>DocumentLibraryForm</Edit>
-  <New>DocumentLibraryForm</New>
-</FormTemplates>
-</file>
-
-<file path=customXml/item3.xml><?xml version="1.0" encoding="utf-8"?>
 <ct:contentTypeSchema xmlns:ct="http://schemas.microsoft.com/office/2006/metadata/contentType" xmlns:ma="http://schemas.microsoft.com/office/2006/metadata/properties/metaAttributes" ct:_="" ma:_="" ma:contentTypeName="Document" ma:contentTypeID="0x01010033097A4ABAC593419D060AF59642542C" ma:contentTypeVersion="0" ma:contentTypeDescription="Create a new document." ma:contentTypeScope="" ma:versionID="902c919d47ba29cd4422f6e846ab53f5">
   <xsd:schema xmlns:xsd="http://www.w3.org/2001/XMLSchema" xmlns:xs="http://www.w3.org/2001/XMLSchema" xmlns:p="http://schemas.microsoft.com/office/2006/metadata/properties" targetNamespace="http://schemas.microsoft.com/office/2006/metadata/properties" ma:root="true" ma:fieldsID="1678f22290366c783442549578815fa4">
     <xsd:element name="properties">
@@ -9436,17 +9414,33 @@
 </ct:contentTypeSchema>
 </file>
 
+<file path=customXml/item2.xml><?xml version="1.0" encoding="utf-8"?>
+<?mso-contentType ?>
+<FormTemplates xmlns="http://schemas.microsoft.com/sharepoint/v3/contenttype/forms">
+  <Display>DocumentLibraryForm</Display>
+  <Edit>DocumentLibraryForm</Edit>
+  <New>DocumentLibraryForm</New>
+</FormTemplates>
+</file>
+
+<file path=customXml/item3.xml><?xml version="1.0" encoding="utf-8"?>
+<p:properties xmlns:p="http://schemas.microsoft.com/office/2006/metadata/properties" xmlns:xsi="http://www.w3.org/2001/XMLSchema-instance" xmlns:pc="http://schemas.microsoft.com/office/infopath/2007/PartnerControls">
+  <documentManagement/>
+</p:properties>
+</file>
+
 <file path=customXml/itemProps1.xml><?xml version="1.0" encoding="utf-8"?>
-<ds:datastoreItem xmlns:ds="http://schemas.openxmlformats.org/officeDocument/2006/customXml" ds:itemID="{88C97F0E-E2C6-4B63-8634-BA49D4239134}">
+<ds:datastoreItem xmlns:ds="http://schemas.openxmlformats.org/officeDocument/2006/customXml" ds:itemID="{1AF3C580-ADE6-48FA-94AE-37E6AC555427}">
   <ds:schemaRefs>
+    <ds:schemaRef ds:uri="http://schemas.microsoft.com/office/2006/metadata/contentType"/>
+    <ds:schemaRef ds:uri="http://schemas.microsoft.com/office/2006/metadata/properties/metaAttributes"/>
+    <ds:schemaRef ds:uri="http://www.w3.org/2001/XMLSchema"/>
+    <ds:schemaRef ds:uri="http://schemas.microsoft.com/office/2006/metadata/properties"/>
+    <ds:schemaRef ds:uri="http://schemas.openxmlformats.org/package/2006/metadata/core-properties"/>
     <ds:schemaRef ds:uri="http://purl.org/dc/elements/1.1/"/>
-    <ds:schemaRef ds:uri="http://schemas.openxmlformats.org/package/2006/metadata/core-properties"/>
-    <ds:schemaRef ds:uri="http://schemas.microsoft.com/office/2006/documentManagement/types"/>
-    <ds:schemaRef ds:uri="http://www.w3.org/XML/1998/namespace"/>
-    <ds:schemaRef ds:uri="http://schemas.microsoft.com/office/2006/metadata/properties"/>
     <ds:schemaRef ds:uri="http://purl.org/dc/terms/"/>
+    <ds:schemaRef ds:uri="http://schemas.microsoft.com/internal/obd"/>
     <ds:schemaRef ds:uri="http://schemas.microsoft.com/office/infopath/2007/PartnerControls"/>
-    <ds:schemaRef ds:uri="http://purl.org/dc/dcmitype/"/>
   </ds:schemaRefs>
 </ds:datastoreItem>
 </file>
@@ -9460,17 +9454,16 @@
 </file>
 
 <file path=customXml/itemProps3.xml><?xml version="1.0" encoding="utf-8"?>
-<ds:datastoreItem xmlns:ds="http://schemas.openxmlformats.org/officeDocument/2006/customXml" ds:itemID="{1AF3C580-ADE6-48FA-94AE-37E6AC555427}">
+<ds:datastoreItem xmlns:ds="http://schemas.openxmlformats.org/officeDocument/2006/customXml" ds:itemID="{88C97F0E-E2C6-4B63-8634-BA49D4239134}">
   <ds:schemaRefs>
-    <ds:schemaRef ds:uri="http://schemas.microsoft.com/office/2006/metadata/contentType"/>
-    <ds:schemaRef ds:uri="http://schemas.microsoft.com/office/2006/metadata/properties/metaAttributes"/>
-    <ds:schemaRef ds:uri="http://www.w3.org/2001/XMLSchema"/>
+    <ds:schemaRef ds:uri="http://purl.org/dc/elements/1.1/"/>
+    <ds:schemaRef ds:uri="http://schemas.openxmlformats.org/package/2006/metadata/core-properties"/>
+    <ds:schemaRef ds:uri="http://schemas.microsoft.com/office/2006/documentManagement/types"/>
+    <ds:schemaRef ds:uri="http://www.w3.org/XML/1998/namespace"/>
     <ds:schemaRef ds:uri="http://schemas.microsoft.com/office/2006/metadata/properties"/>
-    <ds:schemaRef ds:uri="http://schemas.openxmlformats.org/package/2006/metadata/core-properties"/>
-    <ds:schemaRef ds:uri="http://purl.org/dc/elements/1.1/"/>
     <ds:schemaRef ds:uri="http://purl.org/dc/terms/"/>
-    <ds:schemaRef ds:uri="http://schemas.microsoft.com/internal/obd"/>
     <ds:schemaRef ds:uri="http://schemas.microsoft.com/office/infopath/2007/PartnerControls"/>
+    <ds:schemaRef ds:uri="http://purl.org/dc/dcmitype/"/>
   </ds:schemaRefs>
 </ds:datastoreItem>
 </file>
</xml_diff>

<commit_message>
Fixed new user msg
</commit_message>
<xml_diff>
--- a/docs/Workshops_BS01.pptx
+++ b/docs/Workshops_BS01.pptx
@@ -309,7 +309,7 @@
             <a:fld id="{FC51CA57-9460-494E-B0C5-2A3943D86BB4}" type="datetimeFigureOut">
               <a:rPr lang="pl-PL" smtClean="0"/>
               <a:pPr/>
-              <a:t>2015-03-21</a:t>
+              <a:t>2015-03-22</a:t>
             </a:fld>
             <a:endParaRPr lang="pl-PL"/>
           </a:p>
@@ -477,7 +477,7 @@
             <a:fld id="{27575C67-2A2E-44FC-83F5-F396FD42F99B}" type="datetimeFigureOut">
               <a:rPr lang="pl-PL" smtClean="0"/>
               <a:pPr/>
-              <a:t>2015-03-21</a:t>
+              <a:t>2015-03-22</a:t>
             </a:fld>
             <a:endParaRPr lang="pl-PL"/>
           </a:p>
@@ -823,6 +823,91 @@
     <p:extLst>
       <p:ext uri="{BB962C8B-B14F-4D97-AF65-F5344CB8AC3E}">
         <p14:creationId xmlns:p14="http://schemas.microsoft.com/office/powerpoint/2010/main" val="3649266451"/>
+      </p:ext>
+    </p:extLst>
+  </p:cSld>
+  <p:clrMapOvr>
+    <a:masterClrMapping/>
+  </p:clrMapOvr>
+</p:notes>
+</file>
+
+<file path=ppt/notesSlides/notesSlide2.xml><?xml version="1.0" encoding="utf-8"?>
+<p:notes xmlns:a="http://schemas.openxmlformats.org/drawingml/2006/main" xmlns:r="http://schemas.openxmlformats.org/officeDocument/2006/relationships" xmlns:p="http://schemas.openxmlformats.org/presentationml/2006/main">
+  <p:cSld>
+    <p:spTree>
+      <p:nvGrpSpPr>
+        <p:cNvPr id="1" name=""/>
+        <p:cNvGrpSpPr/>
+        <p:nvPr/>
+      </p:nvGrpSpPr>
+      <p:grpSpPr>
+        <a:xfrm>
+          <a:off x="0" y="0"/>
+          <a:ext cx="0" cy="0"/>
+          <a:chOff x="0" y="0"/>
+          <a:chExt cx="0" cy="0"/>
+        </a:xfrm>
+      </p:grpSpPr>
+      <p:sp>
+        <p:nvSpPr>
+          <p:cNvPr id="2" name="Symbol zastępczy obrazu slajdu 1"/>
+          <p:cNvSpPr>
+            <a:spLocks noGrp="1" noRot="1" noChangeAspect="1"/>
+          </p:cNvSpPr>
+          <p:nvPr>
+            <p:ph type="sldImg"/>
+          </p:nvPr>
+        </p:nvSpPr>
+        <p:spPr/>
+      </p:sp>
+      <p:sp>
+        <p:nvSpPr>
+          <p:cNvPr id="3" name="Symbol zastępczy notatek 2"/>
+          <p:cNvSpPr>
+            <a:spLocks noGrp="1"/>
+          </p:cNvSpPr>
+          <p:nvPr>
+            <p:ph type="body" idx="1"/>
+          </p:nvPr>
+        </p:nvSpPr>
+        <p:spPr/>
+        <p:txBody>
+          <a:bodyPr/>
+          <a:lstStyle/>
+          <a:p>
+            <a:endParaRPr lang="pl-PL" dirty="0"/>
+          </a:p>
+        </p:txBody>
+      </p:sp>
+      <p:sp>
+        <p:nvSpPr>
+          <p:cNvPr id="4" name="Symbol zastępczy numeru slajdu 3"/>
+          <p:cNvSpPr>
+            <a:spLocks noGrp="1"/>
+          </p:cNvSpPr>
+          <p:nvPr>
+            <p:ph type="sldNum" sz="quarter" idx="10"/>
+          </p:nvPr>
+        </p:nvSpPr>
+        <p:spPr/>
+        <p:txBody>
+          <a:bodyPr/>
+          <a:lstStyle/>
+          <a:p>
+            <a:fld id="{D58678E7-AC08-4F69-87DC-FDEED7317CB2}" type="slidenum">
+              <a:rPr lang="pl-PL" smtClean="0"/>
+              <a:pPr/>
+              <a:t>12</a:t>
+            </a:fld>
+            <a:endParaRPr lang="pl-PL"/>
+          </a:p>
+        </p:txBody>
+      </p:sp>
+    </p:spTree>
+    <p:extLst>
+      <p:ext uri="{BB962C8B-B14F-4D97-AF65-F5344CB8AC3E}">
+        <p14:creationId xmlns:p14="http://schemas.microsoft.com/office/powerpoint/2010/main" val="472452644"/>
       </p:ext>
     </p:extLst>
   </p:cSld>
@@ -3489,13 +3574,13 @@
   <p:clrMapOvr>
     <a:masterClrMapping/>
   </p:clrMapOvr>
-  <mc:AlternateContent xmlns:mc="http://schemas.openxmlformats.org/markup-compatibility/2006" xmlns:p14="http://schemas.microsoft.com/office/powerpoint/2010/main">
-    <mc:Choice Requires="p14">
+  <mc:AlternateContent xmlns:mc="http://schemas.openxmlformats.org/markup-compatibility/2006">
+    <mc:Choice xmlns:p14="http://schemas.microsoft.com/office/powerpoint/2010/main" Requires="p14">
       <p:transition spd="med" p14:dur="700" advClick="0" advTm="2000">
         <p:fade/>
       </p:transition>
     </mc:Choice>
-    <mc:Fallback xmlns="">
+    <mc:Fallback>
       <p:transition spd="med" advClick="0" advTm="2000">
         <p:fade/>
       </p:transition>
@@ -3675,7 +3760,7 @@
         </p:nvSpPr>
         <p:spPr>
           <a:xfrm>
-            <a:off x="2051720" y="1347614"/>
+            <a:off x="1691680" y="1347614"/>
             <a:ext cx="5945485" cy="2447602"/>
           </a:xfrm>
         </p:spPr>
@@ -3821,189 +3906,13 @@
   <p:clrMapOvr>
     <a:masterClrMapping/>
   </p:clrMapOvr>
-  <mc:AlternateContent xmlns:mc="http://schemas.openxmlformats.org/markup-compatibility/2006" xmlns:p14="http://schemas.microsoft.com/office/powerpoint/2010/main">
-    <mc:Choice Requires="p14">
+  <mc:AlternateContent xmlns:mc="http://schemas.openxmlformats.org/markup-compatibility/2006">
+    <mc:Choice xmlns:p14="http://schemas.microsoft.com/office/powerpoint/2010/main" Requires="p14">
       <p:transition spd="med" p14:dur="700">
         <p:fade/>
       </p:transition>
     </mc:Choice>
-    <mc:Fallback xmlns="">
-      <p:transition spd="med">
-        <p:fade/>
-      </p:transition>
-    </mc:Fallback>
-  </mc:AlternateContent>
-  <p:timing>
-    <p:tnLst>
-      <p:par>
-        <p:cTn id="1" dur="indefinite" restart="never" nodeType="tmRoot"/>
-      </p:par>
-    </p:tnLst>
-  </p:timing>
-</p:sld>
-</file>
-
-<file path=ppt/slides/slide11.xml><?xml version="1.0" encoding="utf-8"?>
-<p:sld xmlns:a="http://schemas.openxmlformats.org/drawingml/2006/main" xmlns:r="http://schemas.openxmlformats.org/officeDocument/2006/relationships" xmlns:p="http://schemas.openxmlformats.org/presentationml/2006/main">
-  <p:cSld>
-    <p:bg>
-      <p:bgPr>
-        <a:blipFill dpi="0" rotWithShape="1">
-          <a:blip r:embed="rId2">
-            <a:lum/>
-          </a:blip>
-          <a:srcRect/>
-          <a:stretch>
-            <a:fillRect/>
-          </a:stretch>
-        </a:blipFill>
-        <a:effectLst/>
-      </p:bgPr>
-    </p:bg>
-    <p:spTree>
-      <p:nvGrpSpPr>
-        <p:cNvPr id="1" name=""/>
-        <p:cNvGrpSpPr/>
-        <p:nvPr/>
-      </p:nvGrpSpPr>
-      <p:grpSpPr>
-        <a:xfrm>
-          <a:off x="0" y="0"/>
-          <a:ext cx="0" cy="0"/>
-          <a:chOff x="0" y="0"/>
-          <a:chExt cx="0" cy="0"/>
-        </a:xfrm>
-      </p:grpSpPr>
-      <p:sp>
-        <p:nvSpPr>
-          <p:cNvPr id="2" name="Tytuł 1"/>
-          <p:cNvSpPr>
-            <a:spLocks noGrp="1"/>
-          </p:cNvSpPr>
-          <p:nvPr>
-            <p:ph type="ctrTitle"/>
-          </p:nvPr>
-        </p:nvSpPr>
-        <p:spPr>
-          <a:xfrm>
-            <a:off x="468313" y="1353346"/>
-            <a:ext cx="8207375" cy="2874588"/>
-          </a:xfrm>
-        </p:spPr>
-        <p:txBody>
-          <a:bodyPr lIns="0" tIns="0" rIns="0" bIns="0" anchor="ctr">
-            <a:noAutofit/>
-          </a:bodyPr>
-          <a:lstStyle/>
-          <a:p>
-            <a:pPr algn="ctr">
-              <a:lnSpc>
-                <a:spcPct val="100000"/>
-              </a:lnSpc>
-            </a:pPr>
-            <a:r>
-              <a:rPr lang="pl-PL" sz="16600" spc="-150" dirty="0" smtClean="0">
-                <a:solidFill>
-                  <a:schemeClr val="tx1"/>
-                </a:solidFill>
-              </a:rPr>
-              <a:t>Q&amp;A</a:t>
-            </a:r>
-            <a:endParaRPr lang="pl-PL" sz="7200" spc="-150" dirty="0">
-              <a:solidFill>
-                <a:schemeClr val="tx1"/>
-              </a:solidFill>
-            </a:endParaRPr>
-          </a:p>
-        </p:txBody>
-      </p:sp>
-      <p:pic>
-        <p:nvPicPr>
-          <p:cNvPr id="4" name="Obraz 3"/>
-          <p:cNvPicPr>
-            <a:picLocks noChangeAspect="1"/>
-          </p:cNvPicPr>
-          <p:nvPr/>
-        </p:nvPicPr>
-        <p:blipFill>
-          <a:blip r:embed="rId3" cstate="print">
-            <a:extLst>
-              <a:ext uri="{28A0092B-C50C-407E-A947-70E740481C1C}">
-                <a14:useLocalDpi xmlns:a14="http://schemas.microsoft.com/office/drawing/2010/main" val="0"/>
-              </a:ext>
-            </a:extLst>
-          </a:blip>
-          <a:stretch>
-            <a:fillRect/>
-          </a:stretch>
-        </p:blipFill>
-        <p:spPr>
-          <a:xfrm>
-            <a:off x="468314" y="484188"/>
-            <a:ext cx="2381254" cy="346224"/>
-          </a:xfrm>
-          <a:prstGeom prst="rect">
-            <a:avLst/>
-          </a:prstGeom>
-        </p:spPr>
-      </p:pic>
-      <p:sp>
-        <p:nvSpPr>
-          <p:cNvPr id="5" name="pole tekstowe 4"/>
-          <p:cNvSpPr txBox="1"/>
-          <p:nvPr/>
-        </p:nvSpPr>
-        <p:spPr>
-          <a:xfrm>
-            <a:off x="468312" y="4659313"/>
-            <a:ext cx="2232248" cy="144462"/>
-          </a:xfrm>
-          <a:prstGeom prst="rect">
-            <a:avLst/>
-          </a:prstGeom>
-          <a:noFill/>
-        </p:spPr>
-        <p:txBody>
-          <a:bodyPr wrap="square" lIns="0" tIns="0" rIns="0" bIns="0" rtlCol="0">
-            <a:noAutofit/>
-          </a:bodyPr>
-          <a:lstStyle/>
-          <a:p>
-            <a:r>
-              <a:rPr lang="en-US" sz="600" dirty="0">
-                <a:solidFill>
-                  <a:schemeClr val="bg2"/>
-                </a:solidFill>
-                <a:latin typeface="HelveticaNeueLT Pro 55 Roman" panose="020B0604020202020204" pitchFamily="34" charset="-18"/>
-              </a:rPr>
-              <a:t>©2014 Grape Up Sp. z o. o. All Rights Reserved.</a:t>
-            </a:r>
-            <a:endParaRPr lang="pl-PL" sz="600" dirty="0">
-              <a:solidFill>
-                <a:schemeClr val="bg2"/>
-              </a:solidFill>
-              <a:latin typeface="HelveticaNeueLT Pro 55 Roman" panose="020B0604020202020204" pitchFamily="34" charset="-18"/>
-            </a:endParaRPr>
-          </a:p>
-        </p:txBody>
-      </p:sp>
-    </p:spTree>
-    <p:extLst>
-      <p:ext uri="{BB962C8B-B14F-4D97-AF65-F5344CB8AC3E}">
-        <p14:creationId xmlns:p14="http://schemas.microsoft.com/office/powerpoint/2010/main" val="3473980535"/>
-      </p:ext>
-    </p:extLst>
-  </p:cSld>
-  <p:clrMapOvr>
-    <a:masterClrMapping/>
-  </p:clrMapOvr>
-  <mc:AlternateContent xmlns:mc="http://schemas.openxmlformats.org/markup-compatibility/2006" xmlns:p14="http://schemas.microsoft.com/office/powerpoint/2010/main">
-    <mc:Choice Requires="p14">
-      <p:transition spd="med" p14:dur="700">
-        <p:fade/>
-      </p:transition>
-    </mc:Choice>
-    <mc:Fallback xmlns="">
+    <mc:Fallback>
       <p:transition spd="med">
         <p:fade/>
       </p:transition>
@@ -4021,6 +3930,9 @@
                     <p:cTn id="3" fill="hold">
                       <p:stCondLst>
                         <p:cond delay="indefinite"/>
+                        <p:cond evt="onBegin" delay="0">
+                          <p:tn val="2"/>
+                        </p:cond>
                       </p:stCondLst>
                       <p:childTnLst>
                         <p:par>
@@ -4030,7 +3942,7 @@
                             </p:stCondLst>
                             <p:childTnLst>
                               <p:par>
-                                <p:cTn id="5" presetID="10" presetClass="entr" presetSubtype="0" fill="hold" nodeType="clickEffect">
+                                <p:cTn id="5" presetID="47" presetClass="entr" presetSubtype="0" fill="hold" grpId="0" nodeType="withEffect">
                                   <p:stCondLst>
                                     <p:cond delay="0"/>
                                   </p:stCondLst>
@@ -4038,50 +3950,6 @@
                                     <p:set>
                                       <p:cBhvr>
                                         <p:cTn id="6" dur="1" fill="hold">
-                                          <p:stCondLst>
-                                            <p:cond delay="0"/>
-                                          </p:stCondLst>
-                                        </p:cTn>
-                                        <p:tgtEl>
-                                          <p:spTgt spid="4"/>
-                                        </p:tgtEl>
-                                        <p:attrNameLst>
-                                          <p:attrName>style.visibility</p:attrName>
-                                        </p:attrNameLst>
-                                      </p:cBhvr>
-                                      <p:to>
-                                        <p:strVal val="visible"/>
-                                      </p:to>
-                                    </p:set>
-                                    <p:animEffect transition="in" filter="fade">
-                                      <p:cBhvr>
-                                        <p:cTn id="7" dur="500"/>
-                                        <p:tgtEl>
-                                          <p:spTgt spid="4"/>
-                                        </p:tgtEl>
-                                      </p:cBhvr>
-                                    </p:animEffect>
-                                  </p:childTnLst>
-                                </p:cTn>
-                              </p:par>
-                            </p:childTnLst>
-                          </p:cTn>
-                        </p:par>
-                        <p:par>
-                          <p:cTn id="8" fill="hold">
-                            <p:stCondLst>
-                              <p:cond delay="500"/>
-                            </p:stCondLst>
-                            <p:childTnLst>
-                              <p:par>
-                                <p:cTn id="9" presetID="47" presetClass="entr" presetSubtype="0" fill="hold" grpId="0" nodeType="afterEffect">
-                                  <p:stCondLst>
-                                    <p:cond delay="0"/>
-                                  </p:stCondLst>
-                                  <p:childTnLst>
-                                    <p:set>
-                                      <p:cBhvr>
-                                        <p:cTn id="10" dur="1" fill="hold">
                                           <p:stCondLst>
                                             <p:cond delay="0"/>
                                           </p:stCondLst>
@@ -4099,7 +3967,7 @@
                                     </p:set>
                                     <p:animEffect transition="in" filter="fade">
                                       <p:cBhvr>
-                                        <p:cTn id="11" dur="1000"/>
+                                        <p:cTn id="7" dur="1000"/>
                                         <p:tgtEl>
                                           <p:spTgt spid="2"/>
                                         </p:tgtEl>
@@ -4107,7 +3975,7 @@
                                     </p:animEffect>
                                     <p:anim calcmode="lin" valueType="num">
                                       <p:cBhvr>
-                                        <p:cTn id="12" dur="1000" fill="hold"/>
+                                        <p:cTn id="8" dur="1000" fill="hold"/>
                                         <p:tgtEl>
                                           <p:spTgt spid="2"/>
                                         </p:tgtEl>
@@ -4130,7 +3998,7 @@
                                     </p:anim>
                                     <p:anim calcmode="lin" valueType="num">
                                       <p:cBhvr>
-                                        <p:cTn id="13" dur="1000" fill="hold"/>
+                                        <p:cTn id="9" dur="1000" fill="hold"/>
                                         <p:tgtEl>
                                           <p:spTgt spid="2"/>
                                         </p:tgtEl>
@@ -4188,13 +4056,317 @@
 </p:sld>
 </file>
 
+<file path=ppt/slides/slide11.xml><?xml version="1.0" encoding="utf-8"?>
+<p:sld xmlns:a="http://schemas.openxmlformats.org/drawingml/2006/main" xmlns:r="http://schemas.openxmlformats.org/officeDocument/2006/relationships" xmlns:p="http://schemas.openxmlformats.org/presentationml/2006/main">
+  <p:cSld>
+    <p:bg>
+      <p:bgPr>
+        <a:blipFill dpi="0" rotWithShape="1">
+          <a:blip r:embed="rId2">
+            <a:lum/>
+          </a:blip>
+          <a:srcRect/>
+          <a:stretch>
+            <a:fillRect/>
+          </a:stretch>
+        </a:blipFill>
+        <a:effectLst/>
+      </p:bgPr>
+    </p:bg>
+    <p:spTree>
+      <p:nvGrpSpPr>
+        <p:cNvPr id="1" name=""/>
+        <p:cNvGrpSpPr/>
+        <p:nvPr/>
+      </p:nvGrpSpPr>
+      <p:grpSpPr>
+        <a:xfrm>
+          <a:off x="0" y="0"/>
+          <a:ext cx="0" cy="0"/>
+          <a:chOff x="0" y="0"/>
+          <a:chExt cx="0" cy="0"/>
+        </a:xfrm>
+      </p:grpSpPr>
+      <p:sp>
+        <p:nvSpPr>
+          <p:cNvPr id="2" name="Tytuł 1"/>
+          <p:cNvSpPr>
+            <a:spLocks noGrp="1"/>
+          </p:cNvSpPr>
+          <p:nvPr>
+            <p:ph type="ctrTitle"/>
+          </p:nvPr>
+        </p:nvSpPr>
+        <p:spPr>
+          <a:xfrm>
+            <a:off x="468313" y="1353346"/>
+            <a:ext cx="8207375" cy="2874588"/>
+          </a:xfrm>
+        </p:spPr>
+        <p:txBody>
+          <a:bodyPr lIns="0" tIns="0" rIns="0" bIns="0" anchor="ctr">
+            <a:noAutofit/>
+          </a:bodyPr>
+          <a:lstStyle/>
+          <a:p>
+            <a:pPr algn="ctr">
+              <a:lnSpc>
+                <a:spcPct val="100000"/>
+              </a:lnSpc>
+            </a:pPr>
+            <a:r>
+              <a:rPr lang="pl-PL" sz="16600" spc="-150" dirty="0" smtClean="0">
+                <a:solidFill>
+                  <a:schemeClr val="tx1"/>
+                </a:solidFill>
+              </a:rPr>
+              <a:t>Q&amp;A</a:t>
+            </a:r>
+            <a:endParaRPr lang="pl-PL" sz="7200" spc="-150" dirty="0">
+              <a:solidFill>
+                <a:schemeClr val="tx1"/>
+              </a:solidFill>
+            </a:endParaRPr>
+          </a:p>
+        </p:txBody>
+      </p:sp>
+      <p:pic>
+        <p:nvPicPr>
+          <p:cNvPr id="4" name="Obraz 3"/>
+          <p:cNvPicPr>
+            <a:picLocks noChangeAspect="1"/>
+          </p:cNvPicPr>
+          <p:nvPr/>
+        </p:nvPicPr>
+        <p:blipFill>
+          <a:blip r:embed="rId3" cstate="print">
+            <a:extLst>
+              <a:ext uri="{28A0092B-C50C-407E-A947-70E740481C1C}">
+                <a14:useLocalDpi xmlns:a14="http://schemas.microsoft.com/office/drawing/2010/main" val="0"/>
+              </a:ext>
+            </a:extLst>
+          </a:blip>
+          <a:stretch>
+            <a:fillRect/>
+          </a:stretch>
+        </p:blipFill>
+        <p:spPr>
+          <a:xfrm>
+            <a:off x="468314" y="484188"/>
+            <a:ext cx="2381254" cy="346224"/>
+          </a:xfrm>
+          <a:prstGeom prst="rect">
+            <a:avLst/>
+          </a:prstGeom>
+        </p:spPr>
+      </p:pic>
+      <p:sp>
+        <p:nvSpPr>
+          <p:cNvPr id="5" name="pole tekstowe 4"/>
+          <p:cNvSpPr txBox="1"/>
+          <p:nvPr/>
+        </p:nvSpPr>
+        <p:spPr>
+          <a:xfrm>
+            <a:off x="468312" y="4659313"/>
+            <a:ext cx="2232248" cy="144462"/>
+          </a:xfrm>
+          <a:prstGeom prst="rect">
+            <a:avLst/>
+          </a:prstGeom>
+          <a:noFill/>
+        </p:spPr>
+        <p:txBody>
+          <a:bodyPr wrap="square" lIns="0" tIns="0" rIns="0" bIns="0" rtlCol="0">
+            <a:noAutofit/>
+          </a:bodyPr>
+          <a:lstStyle/>
+          <a:p>
+            <a:r>
+              <a:rPr lang="en-US" sz="600" dirty="0">
+                <a:solidFill>
+                  <a:schemeClr val="bg2"/>
+                </a:solidFill>
+                <a:latin typeface="HelveticaNeueLT Pro 55 Roman" panose="020B0604020202020204" pitchFamily="34" charset="-18"/>
+              </a:rPr>
+              <a:t>©2014 Grape Up Sp. z o. o. All Rights Reserved.</a:t>
+            </a:r>
+            <a:endParaRPr lang="pl-PL" sz="600" dirty="0">
+              <a:solidFill>
+                <a:schemeClr val="bg2"/>
+              </a:solidFill>
+              <a:latin typeface="HelveticaNeueLT Pro 55 Roman" panose="020B0604020202020204" pitchFamily="34" charset="-18"/>
+            </a:endParaRPr>
+          </a:p>
+        </p:txBody>
+      </p:sp>
+    </p:spTree>
+    <p:extLst>
+      <p:ext uri="{BB962C8B-B14F-4D97-AF65-F5344CB8AC3E}">
+        <p14:creationId xmlns:p14="http://schemas.microsoft.com/office/powerpoint/2010/main" val="3473980535"/>
+      </p:ext>
+    </p:extLst>
+  </p:cSld>
+  <p:clrMapOvr>
+    <a:masterClrMapping/>
+  </p:clrMapOvr>
+  <mc:AlternateContent xmlns:mc="http://schemas.openxmlformats.org/markup-compatibility/2006">
+    <mc:Choice xmlns:p14="http://schemas.microsoft.com/office/powerpoint/2010/main" Requires="p14">
+      <p:transition spd="med" p14:dur="700">
+        <p:fade/>
+      </p:transition>
+    </mc:Choice>
+    <mc:Fallback>
+      <p:transition spd="med">
+        <p:fade/>
+      </p:transition>
+    </mc:Fallback>
+  </mc:AlternateContent>
+  <p:timing>
+    <p:tnLst>
+      <p:par>
+        <p:cTn id="1" dur="indefinite" restart="never" nodeType="tmRoot">
+          <p:childTnLst>
+            <p:seq concurrent="1" nextAc="seek">
+              <p:cTn id="2" dur="indefinite" nodeType="mainSeq">
+                <p:childTnLst>
+                  <p:par>
+                    <p:cTn id="3" fill="hold">
+                      <p:stCondLst>
+                        <p:cond delay="indefinite"/>
+                        <p:cond evt="onBegin" delay="0">
+                          <p:tn val="2"/>
+                        </p:cond>
+                      </p:stCondLst>
+                      <p:childTnLst>
+                        <p:par>
+                          <p:cTn id="4" fill="hold">
+                            <p:stCondLst>
+                              <p:cond delay="0"/>
+                            </p:stCondLst>
+                            <p:childTnLst>
+                              <p:par>
+                                <p:cTn id="5" presetID="42" presetClass="entr" presetSubtype="0" fill="hold" grpId="0" nodeType="withEffect">
+                                  <p:stCondLst>
+                                    <p:cond delay="0"/>
+                                  </p:stCondLst>
+                                  <p:childTnLst>
+                                    <p:set>
+                                      <p:cBhvr>
+                                        <p:cTn id="6" dur="1" fill="hold">
+                                          <p:stCondLst>
+                                            <p:cond delay="0"/>
+                                          </p:stCondLst>
+                                        </p:cTn>
+                                        <p:tgtEl>
+                                          <p:spTgt spid="2"/>
+                                        </p:tgtEl>
+                                        <p:attrNameLst>
+                                          <p:attrName>style.visibility</p:attrName>
+                                        </p:attrNameLst>
+                                      </p:cBhvr>
+                                      <p:to>
+                                        <p:strVal val="visible"/>
+                                      </p:to>
+                                    </p:set>
+                                    <p:animEffect transition="in" filter="fade">
+                                      <p:cBhvr>
+                                        <p:cTn id="7" dur="1000"/>
+                                        <p:tgtEl>
+                                          <p:spTgt spid="2"/>
+                                        </p:tgtEl>
+                                      </p:cBhvr>
+                                    </p:animEffect>
+                                    <p:anim calcmode="lin" valueType="num">
+                                      <p:cBhvr>
+                                        <p:cTn id="8" dur="1000" fill="hold"/>
+                                        <p:tgtEl>
+                                          <p:spTgt spid="2"/>
+                                        </p:tgtEl>
+                                        <p:attrNameLst>
+                                          <p:attrName>ppt_x</p:attrName>
+                                        </p:attrNameLst>
+                                      </p:cBhvr>
+                                      <p:tavLst>
+                                        <p:tav tm="0">
+                                          <p:val>
+                                            <p:strVal val="#ppt_x"/>
+                                          </p:val>
+                                        </p:tav>
+                                        <p:tav tm="100000">
+                                          <p:val>
+                                            <p:strVal val="#ppt_x"/>
+                                          </p:val>
+                                        </p:tav>
+                                      </p:tavLst>
+                                    </p:anim>
+                                    <p:anim calcmode="lin" valueType="num">
+                                      <p:cBhvr>
+                                        <p:cTn id="9" dur="1000" fill="hold"/>
+                                        <p:tgtEl>
+                                          <p:spTgt spid="2"/>
+                                        </p:tgtEl>
+                                        <p:attrNameLst>
+                                          <p:attrName>ppt_y</p:attrName>
+                                        </p:attrNameLst>
+                                      </p:cBhvr>
+                                      <p:tavLst>
+                                        <p:tav tm="0">
+                                          <p:val>
+                                            <p:strVal val="#ppt_y+.1"/>
+                                          </p:val>
+                                        </p:tav>
+                                        <p:tav tm="100000">
+                                          <p:val>
+                                            <p:strVal val="#ppt_y"/>
+                                          </p:val>
+                                        </p:tav>
+                                      </p:tavLst>
+                                    </p:anim>
+                                  </p:childTnLst>
+                                </p:cTn>
+                              </p:par>
+                            </p:childTnLst>
+                          </p:cTn>
+                        </p:par>
+                      </p:childTnLst>
+                    </p:cTn>
+                  </p:par>
+                </p:childTnLst>
+              </p:cTn>
+              <p:prevCondLst>
+                <p:cond evt="onPrev" delay="0">
+                  <p:tgtEl>
+                    <p:sldTgt/>
+                  </p:tgtEl>
+                </p:cond>
+              </p:prevCondLst>
+              <p:nextCondLst>
+                <p:cond evt="onNext" delay="0">
+                  <p:tgtEl>
+                    <p:sldTgt/>
+                  </p:tgtEl>
+                </p:cond>
+              </p:nextCondLst>
+            </p:seq>
+          </p:childTnLst>
+        </p:cTn>
+      </p:par>
+    </p:tnLst>
+    <p:bldLst>
+      <p:bldP spid="2" grpId="0"/>
+    </p:bldLst>
+  </p:timing>
+</p:sld>
+</file>
+
 <file path=ppt/slides/slide12.xml><?xml version="1.0" encoding="utf-8"?>
 <p:sld xmlns:a="http://schemas.openxmlformats.org/drawingml/2006/main" xmlns:r="http://schemas.openxmlformats.org/officeDocument/2006/relationships" xmlns:p="http://schemas.openxmlformats.org/presentationml/2006/main">
   <p:cSld>
     <p:bg>
       <p:bgPr>
         <a:blipFill dpi="0" rotWithShape="1">
-          <a:blip r:embed="rId2">
+          <a:blip r:embed="rId3">
             <a:lum/>
           </a:blip>
           <a:srcRect/>
@@ -4258,16 +4430,78 @@
           </a:p>
         </p:txBody>
       </p:sp>
+      <p:sp>
+        <p:nvSpPr>
+          <p:cNvPr id="2" name="pole tekstowe 1"/>
+          <p:cNvSpPr txBox="1"/>
+          <p:nvPr/>
+        </p:nvSpPr>
+        <p:spPr>
+          <a:xfrm>
+            <a:off x="170838" y="3363838"/>
+            <a:ext cx="7623754" cy="877163"/>
+          </a:xfrm>
+          <a:prstGeom prst="rect">
+            <a:avLst/>
+          </a:prstGeom>
+          <a:noFill/>
+        </p:spPr>
+        <p:txBody>
+          <a:bodyPr wrap="none" rtlCol="0">
+            <a:spAutoFit/>
+          </a:bodyPr>
+          <a:lstStyle/>
+          <a:p>
+            <a:r>
+              <a:rPr lang="pl-PL" sz="1700" dirty="0" smtClean="0">
+                <a:latin typeface="+mj-lt"/>
+              </a:rPr>
+              <a:t>Kod aplikacji dostępny na</a:t>
+            </a:r>
+            <a:r>
+              <a:rPr lang="pl-PL" sz="1700" dirty="0">
+                <a:latin typeface="+mj-lt"/>
+              </a:rPr>
+              <a:t>: </a:t>
+            </a:r>
+            <a:endParaRPr lang="pl-PL" sz="1700" dirty="0" smtClean="0">
+              <a:latin typeface="+mj-lt"/>
+            </a:endParaRPr>
+          </a:p>
+          <a:p>
+            <a:r>
+              <a:rPr lang="pl-PL" sz="1700" dirty="0">
+                <a:latin typeface="+mj-lt"/>
+              </a:rPr>
+              <a:t>https://</a:t>
+            </a:r>
+            <a:r>
+              <a:rPr lang="pl-PL" sz="1700" dirty="0" smtClean="0">
+                <a:latin typeface="+mj-lt"/>
+              </a:rPr>
+              <a:t>github.com/ppmazurGU/workshops_Bialystok/tree/Spotkanie_1</a:t>
+            </a:r>
+          </a:p>
+          <a:p>
+            <a:r>
+              <a:rPr lang="pl-PL" sz="1700" dirty="0">
+                <a:latin typeface="+mj-lt"/>
+              </a:rPr>
+              <a:t>http://goo.gl/tJjn06</a:t>
+            </a:r>
+          </a:p>
+        </p:txBody>
+      </p:sp>
       <p:pic>
         <p:nvPicPr>
-          <p:cNvPr id="6" name="Obraz 5"/>
+          <p:cNvPr id="8" name="Obraz 7"/>
           <p:cNvPicPr>
             <a:picLocks noChangeAspect="1"/>
           </p:cNvPicPr>
           <p:nvPr/>
         </p:nvPicPr>
         <p:blipFill>
-          <a:blip r:embed="rId3" cstate="print">
+          <a:blip r:embed="rId4" cstate="print">
             <a:extLst>
               <a:ext uri="{28A0092B-C50C-407E-A947-70E740481C1C}">
                 <a14:useLocalDpi xmlns:a14="http://schemas.microsoft.com/office/drawing/2010/main" val="0"/>
@@ -4280,8 +4514,8 @@
         </p:blipFill>
         <p:spPr>
           <a:xfrm>
-            <a:off x="468312" y="699542"/>
-            <a:ext cx="4319711" cy="628067"/>
+            <a:off x="468314" y="484188"/>
+            <a:ext cx="2381254" cy="346224"/>
           </a:xfrm>
           <a:prstGeom prst="rect">
             <a:avLst/>
@@ -4290,13 +4524,53 @@
       </p:pic>
       <p:sp>
         <p:nvSpPr>
-          <p:cNvPr id="4" name="pole tekstowe 3"/>
+          <p:cNvPr id="9" name="pole tekstowe 8"/>
           <p:cNvSpPr txBox="1"/>
           <p:nvPr/>
         </p:nvSpPr>
         <p:spPr>
           <a:xfrm>
-            <a:off x="184924" y="1995686"/>
+            <a:off x="468312" y="4659313"/>
+            <a:ext cx="2232248" cy="144462"/>
+          </a:xfrm>
+          <a:prstGeom prst="rect">
+            <a:avLst/>
+          </a:prstGeom>
+          <a:noFill/>
+        </p:spPr>
+        <p:txBody>
+          <a:bodyPr wrap="square" lIns="0" tIns="0" rIns="0" bIns="0" rtlCol="0">
+            <a:noAutofit/>
+          </a:bodyPr>
+          <a:lstStyle/>
+          <a:p>
+            <a:r>
+              <a:rPr lang="en-US" sz="600" dirty="0">
+                <a:solidFill>
+                  <a:schemeClr val="bg2"/>
+                </a:solidFill>
+                <a:latin typeface="HelveticaNeueLT Pro 55 Roman" panose="020B0604020202020204" pitchFamily="34" charset="-18"/>
+              </a:rPr>
+              <a:t>©2014 Grape Up Sp. z o. o. All Rights Reserved.</a:t>
+            </a:r>
+            <a:endParaRPr lang="pl-PL" sz="600" dirty="0">
+              <a:solidFill>
+                <a:schemeClr val="bg2"/>
+              </a:solidFill>
+              <a:latin typeface="HelveticaNeueLT Pro 55 Roman" panose="020B0604020202020204" pitchFamily="34" charset="-18"/>
+            </a:endParaRPr>
+          </a:p>
+        </p:txBody>
+      </p:sp>
+      <p:sp>
+        <p:nvSpPr>
+          <p:cNvPr id="10" name="pole tekstowe 9"/>
+          <p:cNvSpPr txBox="1"/>
+          <p:nvPr/>
+        </p:nvSpPr>
+        <p:spPr>
+          <a:xfrm>
+            <a:off x="182635" y="1759372"/>
             <a:ext cx="5831879" cy="1446550"/>
           </a:xfrm>
           <a:prstGeom prst="rect">
@@ -4322,55 +4596,26 @@
               <a:rPr lang="pl-PL" sz="4400" dirty="0">
                 <a:latin typeface="+mj-lt"/>
               </a:rPr>
-              <a:t>	</a:t>
+              <a:t> </a:t>
+            </a:r>
+            <a:r>
+              <a:rPr lang="pl-PL" sz="4400" dirty="0" smtClean="0">
+                <a:latin typeface="+mj-lt"/>
+              </a:rPr>
+              <a:t>    </a:t>
             </a:r>
             <a:r>
               <a:rPr lang="pl-PL" sz="3600" dirty="0" smtClean="0">
                 <a:latin typeface="+mj-lt"/>
               </a:rPr>
-              <a:t>Białystok 2015</a:t>
-            </a:r>
-          </a:p>
-        </p:txBody>
-      </p:sp>
-      <p:sp>
-        <p:nvSpPr>
-          <p:cNvPr id="2" name="pole tekstowe 1"/>
-          <p:cNvSpPr txBox="1"/>
-          <p:nvPr/>
-        </p:nvSpPr>
-        <p:spPr>
-          <a:xfrm>
-            <a:off x="184924" y="4083918"/>
-            <a:ext cx="7340471" cy="646331"/>
-          </a:xfrm>
-          <a:prstGeom prst="rect">
-            <a:avLst/>
-          </a:prstGeom>
-          <a:noFill/>
-        </p:spPr>
-        <p:txBody>
-          <a:bodyPr wrap="none" rtlCol="0">
-            <a:spAutoFit/>
-          </a:bodyPr>
-          <a:lstStyle/>
-          <a:p>
-            <a:r>
-              <a:rPr lang="pl-PL" dirty="0" smtClean="0"/>
-              <a:t>Kod aplikacji dostępny na</a:t>
-            </a:r>
-            <a:r>
-              <a:rPr lang="pl-PL" dirty="0"/>
-              <a:t>: </a:t>
-            </a:r>
-            <a:endParaRPr lang="pl-PL" dirty="0" smtClean="0"/>
-          </a:p>
-          <a:p>
-            <a:r>
-              <a:rPr lang="pl-PL" dirty="0"/>
-              <a:t>https://github.com/ppmazurGU/workshops_Bialystok/tree/Spotkanie_1</a:t>
-            </a:r>
-            <a:endParaRPr lang="pl-PL" dirty="0"/>
+              <a:t>Białystok </a:t>
+            </a:r>
+            <a:r>
+              <a:rPr lang="pl-PL" sz="3600" dirty="0" smtClean="0">
+                <a:latin typeface="+mj-lt"/>
+              </a:rPr>
+              <a:t>2015</a:t>
+            </a:r>
           </a:p>
         </p:txBody>
       </p:sp>
@@ -4384,13 +4629,13 @@
   <p:clrMapOvr>
     <a:masterClrMapping/>
   </p:clrMapOvr>
-  <mc:AlternateContent xmlns:mc="http://schemas.openxmlformats.org/markup-compatibility/2006" xmlns:p14="http://schemas.microsoft.com/office/powerpoint/2010/main">
-    <mc:Choice Requires="p14">
+  <mc:AlternateContent xmlns:mc="http://schemas.openxmlformats.org/markup-compatibility/2006">
+    <mc:Choice xmlns:p14="http://schemas.microsoft.com/office/powerpoint/2010/main" Requires="p14">
       <p:transition spd="med" p14:dur="700">
         <p:fade/>
       </p:transition>
     </mc:Choice>
-    <mc:Fallback xmlns="">
+    <mc:Fallback>
       <p:transition spd="med">
         <p:fade/>
       </p:transition>
@@ -4408,6 +4653,9 @@
                     <p:cTn id="3" fill="hold">
                       <p:stCondLst>
                         <p:cond delay="indefinite"/>
+                        <p:cond evt="onBegin" delay="0">
+                          <p:tn val="2"/>
+                        </p:cond>
                       </p:stCondLst>
                       <p:childTnLst>
                         <p:par>
@@ -4417,110 +4665,20 @@
                             </p:stCondLst>
                             <p:childTnLst>
                               <p:par>
-                                <p:cTn id="5" presetID="47" presetClass="exit" presetSubtype="0" fill="hold" nodeType="clickEffect">
+                                <p:cTn id="5" presetID="10" presetClass="entr" presetSubtype="0" fill="hold" grpId="0" nodeType="withEffect">
                                   <p:stCondLst>
                                     <p:cond delay="0"/>
                                   </p:stCondLst>
                                   <p:childTnLst>
-                                    <p:animEffect transition="out" filter="fade">
-                                      <p:cBhvr>
-                                        <p:cTn id="6" dur="500"/>
-                                        <p:tgtEl>
-                                          <p:spTgt spid="6"/>
-                                        </p:tgtEl>
-                                      </p:cBhvr>
-                                    </p:animEffect>
-                                    <p:anim calcmode="lin" valueType="num">
-                                      <p:cBhvr>
-                                        <p:cTn id="7" dur="500"/>
-                                        <p:tgtEl>
-                                          <p:spTgt spid="6"/>
-                                        </p:tgtEl>
-                                        <p:attrNameLst>
-                                          <p:attrName>ppt_x</p:attrName>
-                                        </p:attrNameLst>
-                                      </p:cBhvr>
-                                      <p:tavLst>
-                                        <p:tav tm="0">
-                                          <p:val>
-                                            <p:strVal val="ppt_x"/>
-                                          </p:val>
-                                        </p:tav>
-                                        <p:tav tm="100000">
-                                          <p:val>
-                                            <p:strVal val="ppt_x"/>
-                                          </p:val>
-                                        </p:tav>
-                                      </p:tavLst>
-                                    </p:anim>
-                                    <p:anim calcmode="lin" valueType="num">
-                                      <p:cBhvr>
-                                        <p:cTn id="8" dur="500"/>
-                                        <p:tgtEl>
-                                          <p:spTgt spid="6"/>
-                                        </p:tgtEl>
-                                        <p:attrNameLst>
-                                          <p:attrName>ppt_y</p:attrName>
-                                        </p:attrNameLst>
-                                      </p:cBhvr>
-                                      <p:tavLst>
-                                        <p:tav tm="0">
-                                          <p:val>
-                                            <p:strVal val="ppt_y"/>
-                                          </p:val>
-                                        </p:tav>
-                                        <p:tav tm="100000">
-                                          <p:val>
-                                            <p:strVal val="ppt_y-.1"/>
-                                          </p:val>
-                                        </p:tav>
-                                      </p:tavLst>
-                                    </p:anim>
                                     <p:set>
                                       <p:cBhvr>
-                                        <p:cTn id="9" dur="1" fill="hold">
-                                          <p:stCondLst>
-                                            <p:cond delay="499"/>
-                                          </p:stCondLst>
-                                        </p:cTn>
-                                        <p:tgtEl>
-                                          <p:spTgt spid="6"/>
-                                        </p:tgtEl>
-                                        <p:attrNameLst>
-                                          <p:attrName>style.visibility</p:attrName>
-                                        </p:attrNameLst>
-                                      </p:cBhvr>
-                                      <p:to>
-                                        <p:strVal val="hidden"/>
-                                      </p:to>
-                                    </p:set>
-                                  </p:childTnLst>
-                                </p:cTn>
-                              </p:par>
-                              <p:par>
-                                <p:cTn id="10" presetID="42" presetClass="entr" presetSubtype="0" fill="hold" nodeType="withEffect" nodePh="1">
-                                  <p:stCondLst>
-                                    <p:cond delay="500"/>
-                                  </p:stCondLst>
-                                  <p:endCondLst>
-                                    <p:cond evt="begin" delay="0">
-                                      <p:tn val="10"/>
-                                    </p:cond>
-                                  </p:endCondLst>
-                                  <p:childTnLst>
-                                    <p:set>
-                                      <p:cBhvr>
-                                        <p:cTn id="11" dur="1" fill="hold">
+                                        <p:cTn id="6" dur="1" fill="hold">
                                           <p:stCondLst>
                                             <p:cond delay="0"/>
                                           </p:stCondLst>
                                         </p:cTn>
                                         <p:tgtEl>
-                                          <p:spTgt spid="7">
-                                            <p:txEl>
-                                              <p:pRg st="0" end="0"/>
-                                            </p:txEl>
-                                          </p:spTgt>
+                                          <p:spTgt spid="10"/>
                                         </p:tgtEl>
                                         <p:attrNameLst>
                                           <p:attrName>style.visibility</p:attrName>
@@ -4532,102 +4690,9 @@
                                     </p:set>
                                     <p:animEffect transition="in" filter="fade">
                                       <p:cBhvr>
-                                        <p:cTn id="12" dur="1000"/>
+                                        <p:cTn id="7" dur="500"/>
                                         <p:tgtEl>
-                                          <p:spTgt spid="7">
-                                            <p:txEl>
-                                              <p:pRg st="0" end="0"/>
-                                            </p:txEl>
-                                          </p:spTgt>
-                                        </p:tgtEl>
-                                      </p:cBhvr>
-                                    </p:animEffect>
-                                    <p:anim calcmode="lin" valueType="num">
-                                      <p:cBhvr>
-                                        <p:cTn id="13" dur="1000" fill="hold"/>
-                                        <p:tgtEl>
-                                          <p:spTgt spid="7">
-                                            <p:txEl>
-                                              <p:pRg st="0" end="0"/>
-                                            </p:txEl>
-                                          </p:spTgt>
-                                        </p:tgtEl>
-                                        <p:attrNameLst>
-                                          <p:attrName>ppt_x</p:attrName>
-                                        </p:attrNameLst>
-                                      </p:cBhvr>
-                                      <p:tavLst>
-                                        <p:tav tm="0">
-                                          <p:val>
-                                            <p:strVal val="#ppt_x"/>
-                                          </p:val>
-                                        </p:tav>
-                                        <p:tav tm="100000">
-                                          <p:val>
-                                            <p:strVal val="#ppt_x"/>
-                                          </p:val>
-                                        </p:tav>
-                                      </p:tavLst>
-                                    </p:anim>
-                                    <p:anim calcmode="lin" valueType="num">
-                                      <p:cBhvr>
-                                        <p:cTn id="14" dur="1000" fill="hold"/>
-                                        <p:tgtEl>
-                                          <p:spTgt spid="7">
-                                            <p:txEl>
-                                              <p:pRg st="0" end="0"/>
-                                            </p:txEl>
-                                          </p:spTgt>
-                                        </p:tgtEl>
-                                        <p:attrNameLst>
-                                          <p:attrName>ppt_y</p:attrName>
-                                        </p:attrNameLst>
-                                      </p:cBhvr>
-                                      <p:tavLst>
-                                        <p:tav tm="0">
-                                          <p:val>
-                                            <p:strVal val="#ppt_y+.1"/>
-                                          </p:val>
-                                        </p:tav>
-                                        <p:tav tm="100000">
-                                          <p:val>
-                                            <p:strVal val="#ppt_y"/>
-                                          </p:val>
-                                        </p:tav>
-                                      </p:tavLst>
-                                    </p:anim>
-                                  </p:childTnLst>
-                                </p:cTn>
-                              </p:par>
-                              <p:par>
-                                <p:cTn id="15" presetID="10" presetClass="entr" presetSubtype="0" fill="hold" grpId="0" nodeType="withEffect">
-                                  <p:stCondLst>
-                                    <p:cond delay="0"/>
-                                  </p:stCondLst>
-                                  <p:childTnLst>
-                                    <p:set>
-                                      <p:cBhvr>
-                                        <p:cTn id="16" dur="1" fill="hold">
-                                          <p:stCondLst>
-                                            <p:cond delay="0"/>
-                                          </p:stCondLst>
-                                        </p:cTn>
-                                        <p:tgtEl>
-                                          <p:spTgt spid="4"/>
-                                        </p:tgtEl>
-                                        <p:attrNameLst>
-                                          <p:attrName>style.visibility</p:attrName>
-                                        </p:attrNameLst>
-                                      </p:cBhvr>
-                                      <p:to>
-                                        <p:strVal val="visible"/>
-                                      </p:to>
-                                    </p:set>
-                                    <p:animEffect transition="in" filter="fade">
-                                      <p:cBhvr>
-                                        <p:cTn id="17" dur="500"/>
-                                        <p:tgtEl>
-                                          <p:spTgt spid="4"/>
+                                          <p:spTgt spid="10"/>
                                         </p:tgtEl>
                                       </p:cBhvr>
                                     </p:animEffect>
@@ -4662,7 +4727,7 @@
       </p:par>
     </p:tnLst>
     <p:bldLst>
-      <p:bldP spid="4" grpId="0"/>
+      <p:bldP spid="10" grpId="0"/>
     </p:bldLst>
   </p:timing>
 </p:sld>
@@ -4738,7 +4803,7 @@
         </p:nvSpPr>
         <p:spPr>
           <a:xfrm>
-            <a:off x="197421" y="2417662"/>
+            <a:off x="182635" y="2211710"/>
             <a:ext cx="5831879" cy="1446550"/>
           </a:xfrm>
           <a:prstGeom prst="rect">
@@ -4764,13 +4829,25 @@
               <a:rPr lang="pl-PL" sz="4400" dirty="0">
                 <a:latin typeface="+mj-lt"/>
               </a:rPr>
-              <a:t>	</a:t>
+              <a:t> </a:t>
+            </a:r>
+            <a:r>
+              <a:rPr lang="pl-PL" sz="4400" dirty="0" smtClean="0">
+                <a:latin typeface="+mj-lt"/>
+              </a:rPr>
+              <a:t>    </a:t>
             </a:r>
             <a:r>
               <a:rPr lang="pl-PL" sz="3600" dirty="0" smtClean="0">
                 <a:latin typeface="+mj-lt"/>
               </a:rPr>
-              <a:t>Białystok 2015</a:t>
+              <a:t>Białystok </a:t>
+            </a:r>
+            <a:r>
+              <a:rPr lang="pl-PL" sz="3600" dirty="0" smtClean="0">
+                <a:latin typeface="+mj-lt"/>
+              </a:rPr>
+              <a:t>2015</a:t>
             </a:r>
           </a:p>
         </p:txBody>
@@ -4815,12 +4892,16 @@
   <p:clrMapOvr>
     <a:masterClrMapping/>
   </p:clrMapOvr>
-  <mc:AlternateContent xmlns:mc="http://schemas.openxmlformats.org/markup-compatibility/2006" xmlns:p14="http://schemas.microsoft.com/office/powerpoint/2010/main">
-    <mc:Choice Requires="p14">
-      <p:transition p14:dur="10"/>
+  <mc:AlternateContent xmlns:mc="http://schemas.openxmlformats.org/markup-compatibility/2006">
+    <mc:Choice xmlns:p14="http://schemas.microsoft.com/office/powerpoint/2010/main" Requires="p14">
+      <p:transition spd="med" p14:dur="700">
+        <p:fade/>
+      </p:transition>
     </mc:Choice>
-    <mc:Fallback xmlns="">
-      <p:transition/>
+    <mc:Fallback>
+      <p:transition spd="med">
+        <p:fade/>
+      </p:transition>
     </mc:Fallback>
   </mc:AlternateContent>
   <p:timing>
@@ -5054,7 +5135,9 @@
           <a:lstStyle/>
           <a:p>
             <a:r>
-              <a:rPr lang="pl-PL" sz="4800" dirty="0" smtClean="0"/>
+              <a:rPr lang="pl-PL" sz="4800" dirty="0" smtClean="0">
+                <a:latin typeface="+mj-lt"/>
+              </a:rPr>
               <a:t>Paweł Mazur</a:t>
             </a:r>
           </a:p>
@@ -5181,12 +5264,16 @@
   <p:clrMapOvr>
     <a:masterClrMapping/>
   </p:clrMapOvr>
-  <mc:AlternateContent xmlns:mc="http://schemas.openxmlformats.org/markup-compatibility/2006" xmlns:p14="http://schemas.microsoft.com/office/powerpoint/2010/main">
-    <mc:Choice Requires="p14">
-      <p:transition p14:dur="10"/>
+  <mc:AlternateContent xmlns:mc="http://schemas.openxmlformats.org/markup-compatibility/2006">
+    <mc:Choice xmlns:p14="http://schemas.microsoft.com/office/powerpoint/2010/main" Requires="p14">
+      <p:transition spd="med" p14:dur="700">
+        <p:fade/>
+      </p:transition>
     </mc:Choice>
-    <mc:Fallback xmlns="">
-      <p:transition/>
+    <mc:Fallback>
+      <p:transition spd="med">
+        <p:fade/>
+      </p:transition>
     </mc:Fallback>
   </mc:AlternateContent>
   <p:timing>
@@ -5463,7 +5550,7 @@
         <p:spPr>
           <a:xfrm>
             <a:off x="451892" y="1106885"/>
-            <a:ext cx="5975896" cy="3167063"/>
+            <a:ext cx="6712396" cy="3167063"/>
           </a:xfrm>
           <a:prstGeom prst="rect">
             <a:avLst/>
@@ -5649,7 +5736,9 @@
               <a:buNone/>
             </a:pPr>
             <a:r>
-              <a:rPr lang="pl-PL" sz="1000" dirty="0" smtClean="0"/>
+              <a:rPr lang="pl-PL" sz="1000" dirty="0" smtClean="0">
+                <a:latin typeface="+mj-lt"/>
+              </a:rPr>
               <a:t>Spotkanie 1  |  25.03.2015 </a:t>
             </a:r>
           </a:p>
@@ -5658,85 +5747,123 @@
               <a:buNone/>
             </a:pPr>
             <a:r>
-              <a:rPr lang="pl-PL" sz="1000" dirty="0"/>
+              <a:rPr lang="pl-PL" sz="1000" dirty="0">
+                <a:latin typeface="+mj-lt"/>
+              </a:rPr>
               <a:t>	</a:t>
             </a:r>
             <a:r>
-              <a:rPr lang="pl-PL" sz="1000" dirty="0" smtClean="0"/>
+              <a:rPr lang="pl-PL" sz="1000" dirty="0" smtClean="0">
+                <a:latin typeface="+mj-lt"/>
+              </a:rPr>
               <a:t>Przedstawienie </a:t>
             </a:r>
             <a:r>
-              <a:rPr lang="pl-PL" sz="1000" dirty="0" err="1" smtClean="0"/>
+              <a:rPr lang="pl-PL" sz="1000" dirty="0" err="1" smtClean="0">
+                <a:latin typeface="+mj-lt"/>
+              </a:rPr>
               <a:t>frameworku</a:t>
             </a:r>
             <a:r>
-              <a:rPr lang="pl-PL" sz="1000" dirty="0" smtClean="0"/>
+              <a:rPr lang="pl-PL" sz="1000" dirty="0" smtClean="0">
+                <a:latin typeface="+mj-lt"/>
+              </a:rPr>
               <a:t> Node.js oraz </a:t>
             </a:r>
             <a:r>
-              <a:rPr lang="pl-PL" sz="1000" dirty="0" err="1" smtClean="0"/>
+              <a:rPr lang="pl-PL" sz="1000" dirty="0" err="1" smtClean="0">
+                <a:latin typeface="+mj-lt"/>
+              </a:rPr>
               <a:t>server-side</a:t>
             </a:r>
             <a:r>
-              <a:rPr lang="pl-PL" sz="1000" dirty="0" smtClean="0"/>
+              <a:rPr lang="pl-PL" sz="1000" dirty="0" smtClean="0">
+                <a:latin typeface="+mj-lt"/>
+              </a:rPr>
               <a:t> </a:t>
             </a:r>
             <a:r>
-              <a:rPr lang="pl-PL" sz="1000" dirty="0" err="1" smtClean="0"/>
+              <a:rPr lang="pl-PL" sz="1000" dirty="0" err="1" smtClean="0">
+                <a:latin typeface="+mj-lt"/>
+              </a:rPr>
               <a:t>JavaScript</a:t>
             </a:r>
-            <a:endParaRPr lang="pl-PL" sz="1000" dirty="0" smtClean="0"/>
+            <a:endParaRPr lang="pl-PL" sz="1000" dirty="0" smtClean="0">
+              <a:latin typeface="+mj-lt"/>
+            </a:endParaRPr>
           </a:p>
           <a:p>
             <a:pPr marL="0" indent="0">
               <a:buNone/>
             </a:pPr>
             <a:r>
-              <a:rPr lang="pl-PL" sz="1000" dirty="0"/>
+              <a:rPr lang="pl-PL" sz="1000" dirty="0">
+                <a:latin typeface="+mj-lt"/>
+              </a:rPr>
               <a:t>	</a:t>
             </a:r>
             <a:r>
-              <a:rPr lang="pl-PL" sz="1000" dirty="0" smtClean="0"/>
+              <a:rPr lang="pl-PL" sz="1000" dirty="0" smtClean="0">
+                <a:latin typeface="+mj-lt"/>
+              </a:rPr>
               <a:t>Budowa usługi do obsługi </a:t>
             </a:r>
             <a:r>
-              <a:rPr lang="pl-PL" sz="1000" dirty="0" err="1" smtClean="0"/>
+              <a:rPr lang="pl-PL" sz="1000" dirty="0" err="1" smtClean="0">
+                <a:latin typeface="+mj-lt"/>
+              </a:rPr>
               <a:t>chat’u</a:t>
             </a:r>
             <a:r>
-              <a:rPr lang="pl-PL" sz="1000" dirty="0" smtClean="0"/>
+              <a:rPr lang="pl-PL" sz="1000" dirty="0" smtClean="0">
+                <a:latin typeface="+mj-lt"/>
+              </a:rPr>
               <a:t> w oparciu o protokół </a:t>
             </a:r>
             <a:r>
-              <a:rPr lang="pl-PL" sz="1000" dirty="0" err="1" smtClean="0"/>
+              <a:rPr lang="pl-PL" sz="1000" dirty="0" err="1" smtClean="0">
+                <a:latin typeface="+mj-lt"/>
+              </a:rPr>
               <a:t>WebSocket</a:t>
             </a:r>
-            <a:endParaRPr lang="pl-PL" sz="1000" dirty="0" smtClean="0"/>
+            <a:endParaRPr lang="pl-PL" sz="1000" dirty="0" smtClean="0">
+              <a:latin typeface="+mj-lt"/>
+            </a:endParaRPr>
           </a:p>
           <a:p>
             <a:pPr marL="0" indent="0">
               <a:buNone/>
             </a:pPr>
             <a:r>
-              <a:rPr lang="pl-PL" sz="1000" dirty="0"/>
+              <a:rPr lang="pl-PL" sz="1000" dirty="0">
+                <a:latin typeface="+mj-lt"/>
+              </a:rPr>
               <a:t>	</a:t>
             </a:r>
             <a:r>
-              <a:rPr lang="pl-PL" sz="1000" dirty="0" smtClean="0"/>
+              <a:rPr lang="pl-PL" sz="1000" dirty="0" smtClean="0">
+                <a:latin typeface="+mj-lt"/>
+              </a:rPr>
               <a:t>Testy jednostkowe </a:t>
             </a:r>
             <a:r>
-              <a:rPr lang="pl-PL" sz="1000" dirty="0" err="1" smtClean="0"/>
+              <a:rPr lang="pl-PL" sz="1000" dirty="0" err="1" smtClean="0">
+                <a:latin typeface="+mj-lt"/>
+              </a:rPr>
               <a:t>JavaScript</a:t>
             </a:r>
-            <a:endParaRPr lang="pl-PL" sz="1000" dirty="0" smtClean="0"/>
+            <a:endParaRPr lang="pl-PL" sz="1000" dirty="0" smtClean="0">
+              <a:latin typeface="+mj-lt"/>
+            </a:endParaRPr>
           </a:p>
           <a:p>
             <a:pPr marL="0" indent="0">
               <a:buNone/>
             </a:pPr>
             <a:r>
-              <a:rPr lang="pl-PL" sz="1000" dirty="0" smtClean="0"/>
+              <a:rPr lang="pl-PL" sz="1000" dirty="0" smtClean="0">
+                <a:latin typeface="+mj-lt"/>
+              </a:rPr>
               <a:t> </a:t>
             </a:r>
           </a:p>
@@ -5745,7 +5872,9 @@
               <a:buNone/>
             </a:pPr>
             <a:r>
-              <a:rPr lang="pl-PL" sz="1000" dirty="0" smtClean="0"/>
+              <a:rPr lang="pl-PL" sz="1000" dirty="0" smtClean="0">
+                <a:latin typeface="+mj-lt"/>
+              </a:rPr>
               <a:t>Spotkanie 2  |  08.04.2015 / 15.04.2015</a:t>
             </a:r>
           </a:p>
@@ -5754,59 +5883,85 @@
               <a:buNone/>
             </a:pPr>
             <a:r>
-              <a:rPr lang="pl-PL" sz="1000" dirty="0"/>
+              <a:rPr lang="pl-PL" sz="1000" dirty="0">
+                <a:latin typeface="+mj-lt"/>
+              </a:rPr>
               <a:t>	</a:t>
             </a:r>
             <a:r>
-              <a:rPr lang="pl-PL" sz="1000" dirty="0" smtClean="0"/>
+              <a:rPr lang="pl-PL" sz="1000" dirty="0" smtClean="0">
+                <a:latin typeface="+mj-lt"/>
+              </a:rPr>
               <a:t>Tworzenie aplikacji klienckiej z wykorzystaniem </a:t>
             </a:r>
             <a:r>
-              <a:rPr lang="pl-PL" sz="1000" dirty="0" err="1" smtClean="0"/>
+              <a:rPr lang="pl-PL" sz="1000" dirty="0" err="1" smtClean="0">
+                <a:latin typeface="+mj-lt"/>
+              </a:rPr>
               <a:t>frameworku</a:t>
             </a:r>
             <a:r>
-              <a:rPr lang="pl-PL" sz="1000" dirty="0" smtClean="0"/>
+              <a:rPr lang="pl-PL" sz="1000" dirty="0" smtClean="0">
+                <a:latin typeface="+mj-lt"/>
+              </a:rPr>
               <a:t> </a:t>
             </a:r>
             <a:r>
-              <a:rPr lang="pl-PL" sz="1000" dirty="0" err="1" smtClean="0"/>
+              <a:rPr lang="pl-PL" sz="1000" dirty="0" err="1" smtClean="0">
+                <a:latin typeface="+mj-lt"/>
+              </a:rPr>
               <a:t>AngularJS</a:t>
             </a:r>
-            <a:endParaRPr lang="pl-PL" sz="1000" dirty="0" smtClean="0"/>
+            <a:endParaRPr lang="pl-PL" sz="1000" dirty="0" smtClean="0">
+              <a:latin typeface="+mj-lt"/>
+            </a:endParaRPr>
           </a:p>
           <a:p>
             <a:pPr marL="0" indent="0">
               <a:buNone/>
             </a:pPr>
             <a:r>
-              <a:rPr lang="pl-PL" sz="1000" dirty="0"/>
+              <a:rPr lang="pl-PL" sz="1000" dirty="0">
+                <a:latin typeface="+mj-lt"/>
+              </a:rPr>
               <a:t>	</a:t>
             </a:r>
             <a:r>
-              <a:rPr lang="pl-PL" sz="1000" dirty="0" smtClean="0"/>
+              <a:rPr lang="pl-PL" sz="1000" dirty="0" smtClean="0">
+                <a:latin typeface="+mj-lt"/>
+              </a:rPr>
               <a:t>Prezentacja narzędzi takich jak </a:t>
             </a:r>
             <a:r>
-              <a:rPr lang="pl-PL" sz="1000" dirty="0" err="1" smtClean="0"/>
+              <a:rPr lang="pl-PL" sz="1000" dirty="0" err="1" smtClean="0">
+                <a:latin typeface="+mj-lt"/>
+              </a:rPr>
               <a:t>Bower</a:t>
             </a:r>
             <a:r>
-              <a:rPr lang="pl-PL" sz="1000" dirty="0" smtClean="0"/>
+              <a:rPr lang="pl-PL" sz="1000" dirty="0" smtClean="0">
+                <a:latin typeface="+mj-lt"/>
+              </a:rPr>
               <a:t>, </a:t>
             </a:r>
             <a:r>
-              <a:rPr lang="pl-PL" sz="1000" dirty="0" err="1" smtClean="0"/>
+              <a:rPr lang="pl-PL" sz="1000" dirty="0" err="1" smtClean="0">
+                <a:latin typeface="+mj-lt"/>
+              </a:rPr>
               <a:t>Gulp</a:t>
             </a:r>
-            <a:endParaRPr lang="pl-PL" sz="1000" dirty="0" smtClean="0"/>
+            <a:endParaRPr lang="pl-PL" sz="1000" dirty="0" smtClean="0">
+              <a:latin typeface="+mj-lt"/>
+            </a:endParaRPr>
           </a:p>
           <a:p>
             <a:pPr marL="0" indent="0">
               <a:buNone/>
             </a:pPr>
             <a:r>
-              <a:rPr lang="pl-PL" sz="1000" dirty="0" smtClean="0"/>
+              <a:rPr lang="pl-PL" sz="1000" dirty="0" smtClean="0">
+                <a:latin typeface="+mj-lt"/>
+              </a:rPr>
               <a:t> </a:t>
             </a:r>
           </a:p>
@@ -5815,7 +5970,9 @@
               <a:buNone/>
             </a:pPr>
             <a:r>
-              <a:rPr lang="pl-PL" sz="1000" dirty="0" smtClean="0"/>
+              <a:rPr lang="pl-PL" sz="1000" dirty="0" smtClean="0">
+                <a:latin typeface="+mj-lt"/>
+              </a:rPr>
               <a:t>Spotkanie 3  |  22.04.2015 / 06.05.2015</a:t>
             </a:r>
           </a:p>
@@ -5824,52 +5981,76 @@
               <a:buNone/>
             </a:pPr>
             <a:r>
-              <a:rPr lang="pl-PL" sz="1000" dirty="0"/>
+              <a:rPr lang="pl-PL" sz="1000" dirty="0">
+                <a:latin typeface="+mj-lt"/>
+              </a:rPr>
               <a:t>	</a:t>
             </a:r>
             <a:r>
-              <a:rPr lang="pl-PL" sz="1000" dirty="0" smtClean="0"/>
+              <a:rPr lang="pl-PL" sz="1000" dirty="0" smtClean="0">
+                <a:latin typeface="+mj-lt"/>
+              </a:rPr>
               <a:t>Tworzenie </a:t>
             </a:r>
             <a:r>
-              <a:rPr lang="pl-PL" sz="1000" dirty="0" err="1" smtClean="0"/>
+              <a:rPr lang="pl-PL" sz="1000" dirty="0" err="1" smtClean="0">
+                <a:latin typeface="+mj-lt"/>
+              </a:rPr>
               <a:t>responsywnego</a:t>
             </a:r>
             <a:r>
-              <a:rPr lang="pl-PL" sz="1000" dirty="0" smtClean="0"/>
+              <a:rPr lang="pl-PL" sz="1000" dirty="0" smtClean="0">
+                <a:latin typeface="+mj-lt"/>
+              </a:rPr>
               <a:t> interfejsu użytkownika w oparciu o </a:t>
             </a:r>
             <a:r>
-              <a:rPr lang="pl-PL" sz="1000" dirty="0" err="1" smtClean="0"/>
+              <a:rPr lang="pl-PL" sz="1000" dirty="0" err="1" smtClean="0">
+                <a:latin typeface="+mj-lt"/>
+              </a:rPr>
               <a:t>framework</a:t>
             </a:r>
             <a:r>
-              <a:rPr lang="pl-PL" sz="1000" dirty="0" smtClean="0"/>
+              <a:rPr lang="pl-PL" sz="1000" dirty="0" smtClean="0">
+                <a:latin typeface="+mj-lt"/>
+              </a:rPr>
               <a:t> </a:t>
             </a:r>
             <a:r>
-              <a:rPr lang="pl-PL" sz="1000" dirty="0" err="1" smtClean="0"/>
+              <a:rPr lang="pl-PL" sz="1000" dirty="0" err="1" smtClean="0">
+                <a:latin typeface="+mj-lt"/>
+              </a:rPr>
               <a:t>Bootstrap</a:t>
             </a:r>
-            <a:endParaRPr lang="pl-PL" sz="1000" dirty="0" smtClean="0"/>
+            <a:endParaRPr lang="pl-PL" sz="1000" dirty="0" smtClean="0">
+              <a:latin typeface="+mj-lt"/>
+            </a:endParaRPr>
           </a:p>
           <a:p>
             <a:pPr marL="0" indent="0">
               <a:buNone/>
             </a:pPr>
             <a:r>
-              <a:rPr lang="pl-PL" sz="1000" dirty="0"/>
+              <a:rPr lang="pl-PL" sz="1000" dirty="0">
+                <a:latin typeface="+mj-lt"/>
+              </a:rPr>
               <a:t>	</a:t>
             </a:r>
             <a:r>
-              <a:rPr lang="pl-PL" sz="1000" dirty="0" smtClean="0"/>
+              <a:rPr lang="pl-PL" sz="1000" dirty="0" smtClean="0">
+                <a:latin typeface="+mj-lt"/>
+              </a:rPr>
               <a:t>Tworzenie własnych dyrektyw </a:t>
             </a:r>
             <a:r>
-              <a:rPr lang="pl-PL" sz="1000" dirty="0" err="1" smtClean="0"/>
+              <a:rPr lang="pl-PL" sz="1000" dirty="0" err="1" smtClean="0">
+                <a:latin typeface="+mj-lt"/>
+              </a:rPr>
               <a:t>AngularJS</a:t>
             </a:r>
-            <a:endParaRPr lang="pl-PL" sz="1000" dirty="0"/>
+            <a:endParaRPr lang="pl-PL" sz="1000" dirty="0">
+              <a:latin typeface="+mj-lt"/>
+            </a:endParaRPr>
           </a:p>
         </p:txBody>
       </p:sp>
@@ -5913,13 +6094,13 @@
   <p:clrMapOvr>
     <a:masterClrMapping/>
   </p:clrMapOvr>
-  <mc:AlternateContent xmlns:mc="http://schemas.openxmlformats.org/markup-compatibility/2006" xmlns:p14="http://schemas.microsoft.com/office/powerpoint/2010/main">
-    <mc:Choice Requires="p14">
+  <mc:AlternateContent xmlns:mc="http://schemas.openxmlformats.org/markup-compatibility/2006">
+    <mc:Choice xmlns:p14="http://schemas.microsoft.com/office/powerpoint/2010/main" Requires="p14">
       <p:transition spd="med" p14:dur="700">
         <p:fade/>
       </p:transition>
     </mc:Choice>
-    <mc:Fallback xmlns="">
+    <mc:Fallback>
       <p:transition spd="med">
         <p:fade/>
       </p:transition>
@@ -6705,8 +6886,8 @@
         </p:nvSpPr>
         <p:spPr>
           <a:xfrm>
-            <a:off x="1566502" y="915566"/>
-            <a:ext cx="6048672" cy="2592288"/>
+            <a:off x="1584436" y="843558"/>
+            <a:ext cx="6571566" cy="2592288"/>
           </a:xfrm>
           <a:prstGeom prst="rect">
             <a:avLst/>
@@ -6829,13 +7010,13 @@
   <p:clrMapOvr>
     <a:masterClrMapping/>
   </p:clrMapOvr>
-  <mc:AlternateContent xmlns:mc="http://schemas.openxmlformats.org/markup-compatibility/2006" xmlns:p14="http://schemas.microsoft.com/office/powerpoint/2010/main">
-    <mc:Choice Requires="p14">
+  <mc:AlternateContent xmlns:mc="http://schemas.openxmlformats.org/markup-compatibility/2006">
+    <mc:Choice xmlns:p14="http://schemas.microsoft.com/office/powerpoint/2010/main" Requires="p14">
       <p:transition spd="med" p14:dur="700">
         <p:fade/>
       </p:transition>
     </mc:Choice>
-    <mc:Fallback xmlns="">
+    <mc:Fallback>
       <p:transition spd="med">
         <p:fade/>
       </p:transition>
@@ -7074,7 +7255,7 @@
         </p:blipFill>
         <p:spPr bwMode="auto">
           <a:xfrm>
-            <a:off x="6156176" y="1943965"/>
+            <a:off x="2591594" y="1858761"/>
             <a:ext cx="1226468" cy="2764932"/>
           </a:xfrm>
           <a:prstGeom prst="rect">
@@ -7114,7 +7295,7 @@
         </p:blipFill>
         <p:spPr>
           <a:xfrm>
-            <a:off x="2267744" y="2378667"/>
+            <a:off x="5719968" y="2346838"/>
             <a:ext cx="2516434" cy="2211710"/>
           </a:xfrm>
           <a:prstGeom prst="rect">
@@ -7132,13 +7313,13 @@
   <p:clrMapOvr>
     <a:masterClrMapping/>
   </p:clrMapOvr>
-  <mc:AlternateContent xmlns:mc="http://schemas.openxmlformats.org/markup-compatibility/2006" xmlns:p14="http://schemas.microsoft.com/office/powerpoint/2010/main">
-    <mc:Choice Requires="p14">
+  <mc:AlternateContent xmlns:mc="http://schemas.openxmlformats.org/markup-compatibility/2006">
+    <mc:Choice xmlns:p14="http://schemas.microsoft.com/office/powerpoint/2010/main" Requires="p14">
       <p:transition spd="med" p14:dur="700">
         <p:fade/>
       </p:transition>
     </mc:Choice>
-    <mc:Fallback xmlns="">
+    <mc:Fallback>
       <p:transition spd="med">
         <p:fade/>
       </p:transition>
@@ -7465,7 +7646,7 @@
         <p:spPr>
           <a:xfrm>
             <a:off x="394118" y="2067694"/>
-            <a:ext cx="5906073" cy="1554272"/>
+            <a:ext cx="5906073" cy="1938992"/>
           </a:xfrm>
           <a:prstGeom prst="rect">
             <a:avLst/>
@@ -7489,11 +7670,13 @@
               <a:buChar char="—"/>
             </a:pPr>
             <a:r>
-              <a:rPr lang="pl-PL" sz="2000" dirty="0">
+              <a:rPr lang="pl-PL" sz="2000" dirty="0" smtClean="0">
                 <a:solidFill>
-                  <a:srgbClr val="000000"/>
+                  <a:schemeClr val="bg1">
+                    <a:lumMod val="75000"/>
+                    <a:lumOff val="25000"/>
+                  </a:schemeClr>
                 </a:solidFill>
-                <a:latin typeface="+mj-lt"/>
                 <a:ea typeface="Segoe UI" panose="020B0502040204020203" pitchFamily="34" charset="0"/>
                 <a:cs typeface="Segoe UI" panose="020B0502040204020203" pitchFamily="34" charset="0"/>
               </a:rPr>
@@ -7511,7 +7694,7 @@
                 <a:ea typeface="Segoe UI" panose="020B0502040204020203" pitchFamily="34" charset="0"/>
                 <a:cs typeface="Segoe UI" panose="020B0502040204020203" pitchFamily="34" charset="0"/>
               </a:rPr>
-              <a:t>Platforma uruchomieniowa</a:t>
+              <a:t>http://nodejs.org</a:t>
             </a:r>
           </a:p>
           <a:p>
@@ -7537,20 +7720,7 @@
                 <a:ea typeface="Segoe UI" panose="020B0502040204020203" pitchFamily="34" charset="0"/>
                 <a:cs typeface="Segoe UI" panose="020B0502040204020203" pitchFamily="34" charset="0"/>
               </a:rPr>
-              <a:t> </a:t>
-            </a:r>
-            <a:r>
-              <a:rPr lang="pl-PL" sz="2000" dirty="0">
-                <a:solidFill>
-                  <a:schemeClr val="bg1">
-                    <a:lumMod val="75000"/>
-                    <a:lumOff val="25000"/>
-                  </a:schemeClr>
-                </a:solidFill>
-                <a:ea typeface="Segoe UI" panose="020B0502040204020203" pitchFamily="34" charset="0"/>
-                <a:cs typeface="Segoe UI" panose="020B0502040204020203" pitchFamily="34" charset="0"/>
-              </a:rPr>
-              <a:t>V8 </a:t>
+              <a:t> Platforma </a:t>
             </a:r>
             <a:r>
               <a:rPr lang="pl-PL" sz="2000" dirty="0" smtClean="0">
@@ -7560,10 +7730,37 @@
                     <a:lumOff val="25000"/>
                   </a:schemeClr>
                 </a:solidFill>
+                <a:latin typeface="+mj-lt"/>
                 <a:ea typeface="Segoe UI" panose="020B0502040204020203" pitchFamily="34" charset="0"/>
                 <a:cs typeface="Segoe UI" panose="020B0502040204020203" pitchFamily="34" charset="0"/>
               </a:rPr>
-              <a:t>- </a:t>
+              <a:t>uruchomieniowa</a:t>
+            </a:r>
+          </a:p>
+          <a:p>
+            <a:pPr>
+              <a:spcAft>
+                <a:spcPts val="600"/>
+              </a:spcAft>
+              <a:buClr>
+                <a:schemeClr val="bg2"/>
+              </a:buClr>
+              <a:buFont typeface="Campton SemiBold" panose="00000700000000000000" pitchFamily="50" charset="-18"/>
+              <a:buChar char="—"/>
+            </a:pPr>
+            <a:r>
+              <a:rPr lang="pl-PL" sz="2000" dirty="0" smtClean="0">
+                <a:solidFill>
+                  <a:schemeClr val="bg1">
+                    <a:lumMod val="75000"/>
+                    <a:lumOff val="25000"/>
+                  </a:schemeClr>
+                </a:solidFill>
+                <a:latin typeface="+mj-lt"/>
+                <a:ea typeface="Segoe UI" panose="020B0502040204020203" pitchFamily="34" charset="0"/>
+                <a:cs typeface="Segoe UI" panose="020B0502040204020203" pitchFamily="34" charset="0"/>
+              </a:rPr>
+              <a:t> </a:t>
             </a:r>
             <a:r>
               <a:rPr lang="pl-PL" sz="2000" dirty="0">
@@ -7577,7 +7774,7 @@
                 <a:ea typeface="Segoe UI" panose="020B0502040204020203" pitchFamily="34" charset="0"/>
                 <a:cs typeface="Segoe UI" panose="020B0502040204020203" pitchFamily="34" charset="0"/>
               </a:rPr>
-              <a:t>s</a:t>
+              <a:t>V8 </a:t>
             </a:r>
             <a:r>
               <a:rPr lang="pl-PL" sz="2000" dirty="0" smtClean="0">
@@ -7591,6 +7788,34 @@
                 <a:ea typeface="Segoe UI" panose="020B0502040204020203" pitchFamily="34" charset="0"/>
                 <a:cs typeface="Segoe UI" panose="020B0502040204020203" pitchFamily="34" charset="0"/>
               </a:rPr>
+              <a:t>- </a:t>
+            </a:r>
+            <a:r>
+              <a:rPr lang="pl-PL" sz="2000" dirty="0">
+                <a:solidFill>
+                  <a:schemeClr val="bg1">
+                    <a:lumMod val="75000"/>
+                    <a:lumOff val="25000"/>
+                  </a:schemeClr>
+                </a:solidFill>
+                <a:latin typeface="+mj-lt"/>
+                <a:ea typeface="Segoe UI" panose="020B0502040204020203" pitchFamily="34" charset="0"/>
+                <a:cs typeface="Segoe UI" panose="020B0502040204020203" pitchFamily="34" charset="0"/>
+              </a:rPr>
+              <a:t>s</a:t>
+            </a:r>
+            <a:r>
+              <a:rPr lang="pl-PL" sz="2000" dirty="0" smtClean="0">
+                <a:solidFill>
+                  <a:schemeClr val="bg1">
+                    <a:lumMod val="75000"/>
+                    <a:lumOff val="25000"/>
+                  </a:schemeClr>
+                </a:solidFill>
+                <a:latin typeface="+mj-lt"/>
+                <a:ea typeface="Segoe UI" panose="020B0502040204020203" pitchFamily="34" charset="0"/>
+                <a:cs typeface="Segoe UI" panose="020B0502040204020203" pitchFamily="34" charset="0"/>
+              </a:rPr>
               <a:t>ilnik </a:t>
             </a:r>
             <a:r>
@@ -7601,6 +7826,7 @@
                     <a:lumOff val="25000"/>
                   </a:schemeClr>
                 </a:solidFill>
+                <a:latin typeface="+mj-lt"/>
                 <a:ea typeface="Segoe UI" panose="020B0502040204020203" pitchFamily="34" charset="0"/>
                 <a:cs typeface="Segoe UI" panose="020B0502040204020203" pitchFamily="34" charset="0"/>
               </a:rPr>
@@ -7613,6 +7839,7 @@
                   <a:lumOff val="25000"/>
                 </a:schemeClr>
               </a:solidFill>
+              <a:latin typeface="+mj-lt"/>
               <a:ea typeface="Segoe UI" panose="020B0502040204020203" pitchFamily="34" charset="0"/>
               <a:cs typeface="Segoe UI" panose="020B0502040204020203" pitchFamily="34" charset="0"/>
             </a:endParaRPr>
@@ -7636,6 +7863,7 @@
                     <a:lumOff val="25000"/>
                   </a:schemeClr>
                 </a:solidFill>
+                <a:latin typeface="+mj-lt"/>
                 <a:ea typeface="Segoe UI" panose="020B0502040204020203" pitchFamily="34" charset="0"/>
                 <a:cs typeface="Segoe UI" panose="020B0502040204020203" pitchFamily="34" charset="0"/>
               </a:rPr>
@@ -7649,6 +7877,7 @@
                     <a:lumOff val="25000"/>
                   </a:schemeClr>
                 </a:solidFill>
+                <a:latin typeface="+mj-lt"/>
                 <a:ea typeface="Segoe UI" panose="020B0502040204020203" pitchFamily="34" charset="0"/>
                 <a:cs typeface="Segoe UI" panose="020B0502040204020203" pitchFamily="34" charset="0"/>
               </a:rPr>
@@ -7715,13 +7944,13 @@
   <p:clrMapOvr>
     <a:masterClrMapping/>
   </p:clrMapOvr>
-  <mc:AlternateContent xmlns:mc="http://schemas.openxmlformats.org/markup-compatibility/2006" xmlns:p14="http://schemas.microsoft.com/office/powerpoint/2010/main">
-    <mc:Choice Requires="p14">
+  <mc:AlternateContent xmlns:mc="http://schemas.openxmlformats.org/markup-compatibility/2006">
+    <mc:Choice xmlns:p14="http://schemas.microsoft.com/office/powerpoint/2010/main" Requires="p14">
       <p:transition spd="med" p14:dur="700">
         <p:fade/>
       </p:transition>
     </mc:Choice>
-    <mc:Fallback xmlns="">
+    <mc:Fallback>
       <p:transition spd="med">
         <p:fade/>
       </p:transition>
@@ -7788,6 +8017,50 @@
                             </p:childTnLst>
                           </p:cTn>
                         </p:par>
+                        <p:par>
+                          <p:cTn id="8" fill="hold">
+                            <p:stCondLst>
+                              <p:cond delay="1000"/>
+                            </p:stCondLst>
+                            <p:childTnLst>
+                              <p:par>
+                                <p:cTn id="9" presetID="10" presetClass="entr" presetSubtype="0" fill="hold" grpId="0" nodeType="afterEffect">
+                                  <p:stCondLst>
+                                    <p:cond delay="0"/>
+                                  </p:stCondLst>
+                                  <p:childTnLst>
+                                    <p:set>
+                                      <p:cBhvr>
+                                        <p:cTn id="10" dur="1" fill="hold">
+                                          <p:stCondLst>
+                                            <p:cond delay="0"/>
+                                          </p:stCondLst>
+                                        </p:cTn>
+                                        <p:tgtEl>
+                                          <p:spTgt spid="6"/>
+                                        </p:tgtEl>
+                                        <p:attrNameLst>
+                                          <p:attrName>style.visibility</p:attrName>
+                                        </p:attrNameLst>
+                                      </p:cBhvr>
+                                      <p:to>
+                                        <p:strVal val="visible"/>
+                                      </p:to>
+                                    </p:set>
+                                    <p:animEffect transition="in" filter="fade">
+                                      <p:cBhvr>
+                                        <p:cTn id="11" dur="1000"/>
+                                        <p:tgtEl>
+                                          <p:spTgt spid="6"/>
+                                        </p:tgtEl>
+                                      </p:cBhvr>
+                                    </p:animEffect>
+                                  </p:childTnLst>
+                                </p:cTn>
+                              </p:par>
+                            </p:childTnLst>
+                          </p:cTn>
+                        </p:par>
                       </p:childTnLst>
                     </p:cTn>
                   </p:par>
@@ -7812,6 +8085,9 @@
         </p:cTn>
       </p:par>
     </p:tnLst>
+    <p:bldLst>
+      <p:bldP spid="6" grpId="0"/>
+    </p:bldLst>
   </p:timing>
 </p:sld>
 </file>
@@ -7967,7 +8243,7 @@
         <p:spPr>
           <a:xfrm>
             <a:off x="2700560" y="1528689"/>
-            <a:ext cx="5906073" cy="1554272"/>
+            <a:ext cx="5906073" cy="1938992"/>
           </a:xfrm>
           <a:prstGeom prst="rect">
             <a:avLst/>
@@ -8002,7 +8278,7 @@
                 <a:ea typeface="Segoe UI" panose="020B0502040204020203" pitchFamily="34" charset="0"/>
                 <a:cs typeface="Segoe UI" panose="020B0502040204020203" pitchFamily="34" charset="0"/>
               </a:rPr>
-              <a:t> S</a:t>
+              <a:t> http://</a:t>
             </a:r>
             <a:r>
               <a:rPr lang="pl-PL" sz="2000" dirty="0" smtClean="0">
@@ -8016,8 +8292,19 @@
                 <a:ea typeface="Segoe UI" panose="020B0502040204020203" pitchFamily="34" charset="0"/>
                 <a:cs typeface="Segoe UI" panose="020B0502040204020203" pitchFamily="34" charset="0"/>
               </a:rPr>
-              <a:t>ystem automatyzacji pracy</a:t>
-            </a:r>
+              <a:t>gulpjs.com</a:t>
+            </a:r>
+            <a:endParaRPr lang="pl-PL" sz="2000" dirty="0" smtClean="0">
+              <a:solidFill>
+                <a:schemeClr val="bg1">
+                  <a:lumMod val="75000"/>
+                  <a:lumOff val="25000"/>
+                </a:schemeClr>
+              </a:solidFill>
+              <a:latin typeface="+mj-lt"/>
+              <a:ea typeface="Segoe UI" panose="020B0502040204020203" pitchFamily="34" charset="0"/>
+              <a:cs typeface="Segoe UI" panose="020B0502040204020203" pitchFamily="34" charset="0"/>
+            </a:endParaRPr>
           </a:p>
           <a:p>
             <a:pPr>
@@ -8042,33 +8329,7 @@
                 <a:ea typeface="Segoe UI" panose="020B0502040204020203" pitchFamily="34" charset="0"/>
                 <a:cs typeface="Segoe UI" panose="020B0502040204020203" pitchFamily="34" charset="0"/>
               </a:rPr>
-              <a:t> </a:t>
-            </a:r>
-            <a:r>
-              <a:rPr lang="pl-PL" sz="2000" dirty="0">
-                <a:solidFill>
-                  <a:schemeClr val="bg1">
-                    <a:lumMod val="75000"/>
-                    <a:lumOff val="25000"/>
-                  </a:schemeClr>
-                </a:solidFill>
-                <a:ea typeface="Segoe UI" panose="020B0502040204020203" pitchFamily="34" charset="0"/>
-                <a:cs typeface="Segoe UI" panose="020B0502040204020203" pitchFamily="34" charset="0"/>
-              </a:rPr>
-              <a:t>Konkurent dla </a:t>
-            </a:r>
-            <a:r>
-              <a:rPr lang="pl-PL" sz="2000" dirty="0" err="1">
-                <a:solidFill>
-                  <a:schemeClr val="bg1">
-                    <a:lumMod val="75000"/>
-                    <a:lumOff val="25000"/>
-                  </a:schemeClr>
-                </a:solidFill>
-                <a:ea typeface="Segoe UI" panose="020B0502040204020203" pitchFamily="34" charset="0"/>
-                <a:cs typeface="Segoe UI" panose="020B0502040204020203" pitchFamily="34" charset="0"/>
-              </a:rPr>
-              <a:t>Grunt’a</a:t>
+              <a:t> System </a:t>
             </a:r>
             <a:r>
               <a:rPr lang="pl-PL" sz="2000" dirty="0" smtClean="0">
@@ -8082,7 +8343,7 @@
                 <a:ea typeface="Segoe UI" panose="020B0502040204020203" pitchFamily="34" charset="0"/>
                 <a:cs typeface="Segoe UI" panose="020B0502040204020203" pitchFamily="34" charset="0"/>
               </a:rPr>
-              <a:t> </a:t>
+              <a:t>automatyzacji pracy</a:t>
             </a:r>
           </a:p>
           <a:p>
@@ -8108,18 +8369,50 @@
                 <a:ea typeface="Segoe UI" panose="020B0502040204020203" pitchFamily="34" charset="0"/>
                 <a:cs typeface="Segoe UI" panose="020B0502040204020203" pitchFamily="34" charset="0"/>
               </a:rPr>
-              <a:t> Budowanie aplikacji</a:t>
-            </a:r>
-            <a:endParaRPr lang="pl-PL" sz="2000" dirty="0" smtClean="0">
-              <a:solidFill>
-                <a:schemeClr val="bg1">
-                  <a:lumMod val="75000"/>
-                  <a:lumOff val="25000"/>
-                </a:schemeClr>
-              </a:solidFill>
-              <a:ea typeface="Segoe UI" panose="020B0502040204020203" pitchFamily="34" charset="0"/>
-              <a:cs typeface="Segoe UI" panose="020B0502040204020203" pitchFamily="34" charset="0"/>
-            </a:endParaRPr>
+              <a:t> </a:t>
+            </a:r>
+            <a:r>
+              <a:rPr lang="pl-PL" sz="2000" dirty="0">
+                <a:solidFill>
+                  <a:schemeClr val="bg1">
+                    <a:lumMod val="75000"/>
+                    <a:lumOff val="25000"/>
+                  </a:schemeClr>
+                </a:solidFill>
+                <a:latin typeface="+mj-lt"/>
+                <a:ea typeface="Segoe UI" panose="020B0502040204020203" pitchFamily="34" charset="0"/>
+                <a:cs typeface="Segoe UI" panose="020B0502040204020203" pitchFamily="34" charset="0"/>
+              </a:rPr>
+              <a:t>Konkurent dla </a:t>
+            </a:r>
+            <a:r>
+              <a:rPr lang="pl-PL" sz="2000" dirty="0" err="1">
+                <a:solidFill>
+                  <a:schemeClr val="bg1">
+                    <a:lumMod val="75000"/>
+                    <a:lumOff val="25000"/>
+                  </a:schemeClr>
+                </a:solidFill>
+                <a:latin typeface="+mj-lt"/>
+                <a:ea typeface="Segoe UI" panose="020B0502040204020203" pitchFamily="34" charset="0"/>
+                <a:cs typeface="Segoe UI" panose="020B0502040204020203" pitchFamily="34" charset="0"/>
+              </a:rPr>
+              <a:t>Grunt’a</a:t>
+            </a:r>
+            <a:r>
+              <a:rPr lang="pl-PL" sz="2000" dirty="0" smtClean="0">
+                <a:solidFill>
+                  <a:schemeClr val="bg1">
+                    <a:lumMod val="75000"/>
+                    <a:lumOff val="25000"/>
+                  </a:schemeClr>
+                </a:solidFill>
+                <a:latin typeface="+mj-lt"/>
+                <a:ea typeface="Segoe UI" panose="020B0502040204020203" pitchFamily="34" charset="0"/>
+                <a:cs typeface="Segoe UI" panose="020B0502040204020203" pitchFamily="34" charset="0"/>
+              </a:rPr>
+              <a:t> </a:t>
+            </a:r>
           </a:p>
           <a:p>
             <a:pPr>
@@ -8140,11 +8433,24 @@
                     <a:lumOff val="25000"/>
                   </a:schemeClr>
                 </a:solidFill>
+                <a:latin typeface="+mj-lt"/>
                 <a:ea typeface="Segoe UI" panose="020B0502040204020203" pitchFamily="34" charset="0"/>
                 <a:cs typeface="Segoe UI" panose="020B0502040204020203" pitchFamily="34" charset="0"/>
               </a:rPr>
-              <a:t> </a:t>
-            </a:r>
+              <a:t> Budowanie aplikacji</a:t>
+            </a:r>
+          </a:p>
+          <a:p>
+            <a:pPr>
+              <a:spcAft>
+                <a:spcPts val="600"/>
+              </a:spcAft>
+              <a:buClr>
+                <a:schemeClr val="bg2"/>
+              </a:buClr>
+              <a:buFont typeface="Campton SemiBold" panose="00000700000000000000" pitchFamily="50" charset="-18"/>
+              <a:buChar char="—"/>
+            </a:pPr>
             <a:r>
               <a:rPr lang="pl-PL" sz="2000" dirty="0" smtClean="0">
                 <a:solidFill>
@@ -8157,7 +8463,7 @@
                 <a:ea typeface="Segoe UI" panose="020B0502040204020203" pitchFamily="34" charset="0"/>
                 <a:cs typeface="Segoe UI" panose="020B0502040204020203" pitchFamily="34" charset="0"/>
               </a:rPr>
-              <a:t>Liczne </a:t>
+              <a:t> Liczne </a:t>
             </a:r>
             <a:r>
               <a:rPr lang="pl-PL" sz="2000" dirty="0" err="1" smtClean="0">
@@ -8197,13 +8503,13 @@
   <p:clrMapOvr>
     <a:masterClrMapping/>
   </p:clrMapOvr>
-  <mc:AlternateContent xmlns:mc="http://schemas.openxmlformats.org/markup-compatibility/2006" xmlns:p14="http://schemas.microsoft.com/office/powerpoint/2010/main">
-    <mc:Choice Requires="p14">
+  <mc:AlternateContent xmlns:mc="http://schemas.openxmlformats.org/markup-compatibility/2006">
+    <mc:Choice xmlns:p14="http://schemas.microsoft.com/office/powerpoint/2010/main" Requires="p14">
       <p:transition spd="med" p14:dur="700">
         <p:fade/>
       </p:transition>
     </mc:Choice>
-    <mc:Fallback xmlns="">
+    <mc:Fallback>
       <p:transition spd="med">
         <p:fade/>
       </p:transition>
@@ -8221,6 +8527,9 @@
                     <p:cTn id="3" fill="hold">
                       <p:stCondLst>
                         <p:cond delay="indefinite"/>
+                        <p:cond evt="onBegin" delay="0">
+                          <p:tn val="2"/>
+                        </p:cond>
                       </p:stCondLst>
                       <p:childTnLst>
                         <p:par>
@@ -8230,7 +8539,7 @@
                             </p:stCondLst>
                             <p:childTnLst>
                               <p:par>
-                                <p:cTn id="5" presetID="10" presetClass="entr" presetSubtype="0" fill="hold" nodeType="clickEffect">
+                                <p:cTn id="5" presetID="10" presetClass="entr" presetSubtype="0" fill="hold" nodeType="withEffect">
                                   <p:stCondLst>
                                     <p:cond delay="0"/>
                                   </p:stCondLst>
@@ -8267,6 +8576,50 @@
                             </p:childTnLst>
                           </p:cTn>
                         </p:par>
+                        <p:par>
+                          <p:cTn id="8" fill="hold">
+                            <p:stCondLst>
+                              <p:cond delay="1000"/>
+                            </p:stCondLst>
+                            <p:childTnLst>
+                              <p:par>
+                                <p:cTn id="9" presetID="10" presetClass="entr" presetSubtype="0" fill="hold" grpId="0" nodeType="afterEffect">
+                                  <p:stCondLst>
+                                    <p:cond delay="0"/>
+                                  </p:stCondLst>
+                                  <p:childTnLst>
+                                    <p:set>
+                                      <p:cBhvr>
+                                        <p:cTn id="10" dur="1" fill="hold">
+                                          <p:stCondLst>
+                                            <p:cond delay="0"/>
+                                          </p:stCondLst>
+                                        </p:cTn>
+                                        <p:tgtEl>
+                                          <p:spTgt spid="10"/>
+                                        </p:tgtEl>
+                                        <p:attrNameLst>
+                                          <p:attrName>style.visibility</p:attrName>
+                                        </p:attrNameLst>
+                                      </p:cBhvr>
+                                      <p:to>
+                                        <p:strVal val="visible"/>
+                                      </p:to>
+                                    </p:set>
+                                    <p:animEffect transition="in" filter="fade">
+                                      <p:cBhvr>
+                                        <p:cTn id="11" dur="1000"/>
+                                        <p:tgtEl>
+                                          <p:spTgt spid="10"/>
+                                        </p:tgtEl>
+                                      </p:cBhvr>
+                                    </p:animEffect>
+                                  </p:childTnLst>
+                                </p:cTn>
+                              </p:par>
+                            </p:childTnLst>
+                          </p:cTn>
+                        </p:par>
                       </p:childTnLst>
                     </p:cTn>
                   </p:par>
@@ -8291,6 +8644,9 @@
         </p:cTn>
       </p:par>
     </p:tnLst>
+    <p:bldLst>
+      <p:bldP spid="10" grpId="0"/>
+    </p:bldLst>
   </p:timing>
 </p:sld>
 </file>
@@ -8405,7 +8761,7 @@
         <p:spPr>
           <a:xfrm>
             <a:off x="495724" y="1536803"/>
-            <a:ext cx="5906073" cy="400110"/>
+            <a:ext cx="5906073" cy="1554272"/>
           </a:xfrm>
           <a:prstGeom prst="rect">
             <a:avLst/>
@@ -8440,7 +8796,7 @@
                 <a:ea typeface="Segoe UI" panose="020B0502040204020203" pitchFamily="34" charset="0"/>
                 <a:cs typeface="Segoe UI" panose="020B0502040204020203" pitchFamily="34" charset="0"/>
               </a:rPr>
-              <a:t> </a:t>
+              <a:t> http://</a:t>
             </a:r>
             <a:r>
               <a:rPr lang="pl-PL" sz="2000" dirty="0" smtClean="0">
@@ -8454,7 +8810,163 @@
                 <a:ea typeface="Segoe UI" panose="020B0502040204020203" pitchFamily="34" charset="0"/>
                 <a:cs typeface="Segoe UI" panose="020B0502040204020203" pitchFamily="34" charset="0"/>
               </a:rPr>
-              <a:t>Dwukierunkowy kanał komunikacji</a:t>
+              <a:t>www.websocket.org </a:t>
+            </a:r>
+            <a:endParaRPr lang="pl-PL" sz="2000" dirty="0" smtClean="0">
+              <a:solidFill>
+                <a:schemeClr val="bg1">
+                  <a:lumMod val="75000"/>
+                  <a:lumOff val="25000"/>
+                </a:schemeClr>
+              </a:solidFill>
+              <a:latin typeface="+mj-lt"/>
+              <a:ea typeface="Segoe UI" panose="020B0502040204020203" pitchFamily="34" charset="0"/>
+              <a:cs typeface="Segoe UI" panose="020B0502040204020203" pitchFamily="34" charset="0"/>
+            </a:endParaRPr>
+          </a:p>
+          <a:p>
+            <a:pPr>
+              <a:spcAft>
+                <a:spcPts val="600"/>
+              </a:spcAft>
+              <a:buClr>
+                <a:schemeClr val="bg2"/>
+              </a:buClr>
+              <a:buFont typeface="Campton SemiBold" panose="00000700000000000000" pitchFamily="50" charset="-18"/>
+              <a:buChar char="—"/>
+            </a:pPr>
+            <a:r>
+              <a:rPr lang="pl-PL" sz="2000" dirty="0" smtClean="0">
+                <a:solidFill>
+                  <a:schemeClr val="bg1">
+                    <a:lumMod val="75000"/>
+                    <a:lumOff val="25000"/>
+                  </a:schemeClr>
+                </a:solidFill>
+                <a:latin typeface="+mj-lt"/>
+                <a:ea typeface="Segoe UI" panose="020B0502040204020203" pitchFamily="34" charset="0"/>
+                <a:cs typeface="Segoe UI" panose="020B0502040204020203" pitchFamily="34" charset="0"/>
+              </a:rPr>
+              <a:t> Dwukierunkowy </a:t>
+            </a:r>
+            <a:r>
+              <a:rPr lang="pl-PL" sz="2000" dirty="0" smtClean="0">
+                <a:solidFill>
+                  <a:schemeClr val="bg1">
+                    <a:lumMod val="75000"/>
+                    <a:lumOff val="25000"/>
+                  </a:schemeClr>
+                </a:solidFill>
+                <a:latin typeface="+mj-lt"/>
+                <a:ea typeface="Segoe UI" panose="020B0502040204020203" pitchFamily="34" charset="0"/>
+                <a:cs typeface="Segoe UI" panose="020B0502040204020203" pitchFamily="34" charset="0"/>
+              </a:rPr>
+              <a:t>kanał </a:t>
+            </a:r>
+            <a:r>
+              <a:rPr lang="pl-PL" sz="2000" dirty="0" smtClean="0">
+                <a:solidFill>
+                  <a:schemeClr val="bg1">
+                    <a:lumMod val="75000"/>
+                    <a:lumOff val="25000"/>
+                  </a:schemeClr>
+                </a:solidFill>
+                <a:latin typeface="+mj-lt"/>
+                <a:ea typeface="Segoe UI" panose="020B0502040204020203" pitchFamily="34" charset="0"/>
+                <a:cs typeface="Segoe UI" panose="020B0502040204020203" pitchFamily="34" charset="0"/>
+              </a:rPr>
+              <a:t>komunikacji</a:t>
+            </a:r>
+          </a:p>
+          <a:p>
+            <a:pPr>
+              <a:spcAft>
+                <a:spcPts val="600"/>
+              </a:spcAft>
+              <a:buClr>
+                <a:schemeClr val="bg2"/>
+              </a:buClr>
+              <a:buFont typeface="Campton SemiBold" panose="00000700000000000000" pitchFamily="50" charset="-18"/>
+              <a:buChar char="—"/>
+            </a:pPr>
+            <a:r>
+              <a:rPr lang="pl-PL" sz="2000" dirty="0">
+                <a:solidFill>
+                  <a:schemeClr val="bg1">
+                    <a:lumMod val="75000"/>
+                    <a:lumOff val="25000"/>
+                  </a:schemeClr>
+                </a:solidFill>
+                <a:latin typeface="+mj-lt"/>
+                <a:ea typeface="Segoe UI" panose="020B0502040204020203" pitchFamily="34" charset="0"/>
+                <a:cs typeface="Segoe UI" panose="020B0502040204020203" pitchFamily="34" charset="0"/>
+              </a:rPr>
+              <a:t> </a:t>
+            </a:r>
+            <a:r>
+              <a:rPr lang="pl-PL" sz="2000" dirty="0" smtClean="0">
+                <a:solidFill>
+                  <a:schemeClr val="bg1">
+                    <a:lumMod val="75000"/>
+                    <a:lumOff val="25000"/>
+                  </a:schemeClr>
+                </a:solidFill>
+                <a:latin typeface="+mj-lt"/>
+                <a:ea typeface="Segoe UI" panose="020B0502040204020203" pitchFamily="34" charset="0"/>
+                <a:cs typeface="Segoe UI" panose="020B0502040204020203" pitchFamily="34" charset="0"/>
+              </a:rPr>
+              <a:t>Czaty, gry, komunikacja audio/video</a:t>
+            </a:r>
+            <a:endParaRPr lang="pl-PL" sz="2000" dirty="0">
+              <a:solidFill>
+                <a:schemeClr val="bg1">
+                  <a:lumMod val="75000"/>
+                  <a:lumOff val="25000"/>
+                </a:schemeClr>
+              </a:solidFill>
+              <a:latin typeface="+mj-lt"/>
+              <a:ea typeface="Segoe UI" panose="020B0502040204020203" pitchFamily="34" charset="0"/>
+              <a:cs typeface="Segoe UI" panose="020B0502040204020203" pitchFamily="34" charset="0"/>
+            </a:endParaRPr>
+          </a:p>
+          <a:p>
+            <a:pPr>
+              <a:spcAft>
+                <a:spcPts val="600"/>
+              </a:spcAft>
+              <a:buClr>
+                <a:schemeClr val="bg2"/>
+              </a:buClr>
+              <a:buFont typeface="Campton SemiBold" panose="00000700000000000000" pitchFamily="50" charset="-18"/>
+              <a:buChar char="—"/>
+            </a:pPr>
+            <a:r>
+              <a:rPr lang="pl-PL" sz="2000" dirty="0" smtClean="0">
+                <a:solidFill>
+                  <a:schemeClr val="bg1">
+                    <a:lumMod val="75000"/>
+                    <a:lumOff val="25000"/>
+                  </a:schemeClr>
+                </a:solidFill>
+                <a:latin typeface="+mj-lt"/>
+                <a:ea typeface="Segoe UI" panose="020B0502040204020203" pitchFamily="34" charset="0"/>
+                <a:cs typeface="Segoe UI" panose="020B0502040204020203" pitchFamily="34" charset="0"/>
+              </a:rPr>
+              <a:t> </a:t>
+            </a:r>
+            <a:r>
+              <a:rPr lang="pl-PL" sz="2000" dirty="0" smtClean="0">
+                <a:solidFill>
+                  <a:schemeClr val="bg1">
+                    <a:lumMod val="75000"/>
+                    <a:lumOff val="25000"/>
+                  </a:schemeClr>
+                </a:solidFill>
+                <a:latin typeface="+mj-lt"/>
+                <a:ea typeface="Segoe UI" panose="020B0502040204020203" pitchFamily="34" charset="0"/>
+                <a:cs typeface="Segoe UI" panose="020B0502040204020203" pitchFamily="34" charset="0"/>
+              </a:rPr>
+              <a:t>Wspierany od IE10</a:t>
             </a:r>
           </a:p>
         </p:txBody>
@@ -8486,6 +8998,7 @@
                 <a:solidFill>
                   <a:schemeClr val="bg2"/>
                 </a:solidFill>
+                <a:latin typeface="+mj-lt"/>
               </a:rPr>
               <a:t>WebSocket</a:t>
             </a:r>
@@ -8493,6 +9006,7 @@
               <a:solidFill>
                 <a:schemeClr val="bg2"/>
               </a:solidFill>
+              <a:latin typeface="+mj-lt"/>
             </a:endParaRPr>
           </a:p>
         </p:txBody>
@@ -8507,13 +9021,13 @@
   <p:clrMapOvr>
     <a:masterClrMapping/>
   </p:clrMapOvr>
-  <mc:AlternateContent xmlns:mc="http://schemas.openxmlformats.org/markup-compatibility/2006" xmlns:p14="http://schemas.microsoft.com/office/powerpoint/2010/main">
-    <mc:Choice Requires="p14">
+  <mc:AlternateContent xmlns:mc="http://schemas.openxmlformats.org/markup-compatibility/2006">
+    <mc:Choice xmlns:p14="http://schemas.microsoft.com/office/powerpoint/2010/main" Requires="p14">
       <p:transition spd="med" p14:dur="700">
         <p:fade/>
       </p:transition>
     </mc:Choice>
-    <mc:Fallback xmlns="">
+    <mc:Fallback>
       <p:transition spd="med">
         <p:fade/>
       </p:transition>
@@ -8522,9 +9036,136 @@
   <p:timing>
     <p:tnLst>
       <p:par>
-        <p:cTn id="1" dur="indefinite" restart="never" nodeType="tmRoot"/>
+        <p:cTn id="1" dur="indefinite" restart="never" nodeType="tmRoot">
+          <p:childTnLst>
+            <p:seq concurrent="1" nextAc="seek">
+              <p:cTn id="2" dur="indefinite" nodeType="mainSeq">
+                <p:childTnLst>
+                  <p:par>
+                    <p:cTn id="3" fill="hold">
+                      <p:stCondLst>
+                        <p:cond delay="indefinite"/>
+                        <p:cond evt="onBegin" delay="0">
+                          <p:tn val="2"/>
+                        </p:cond>
+                      </p:stCondLst>
+                      <p:childTnLst>
+                        <p:par>
+                          <p:cTn id="4" fill="hold">
+                            <p:stCondLst>
+                              <p:cond delay="0"/>
+                            </p:stCondLst>
+                            <p:childTnLst>
+                              <p:par>
+                                <p:cTn id="5" presetID="10" presetClass="entr" presetSubtype="0" fill="hold" grpId="0" nodeType="withEffect">
+                                  <p:stCondLst>
+                                    <p:cond delay="0"/>
+                                  </p:stCondLst>
+                                  <p:childTnLst>
+                                    <p:set>
+                                      <p:cBhvr>
+                                        <p:cTn id="6" dur="1" fill="hold">
+                                          <p:stCondLst>
+                                            <p:cond delay="0"/>
+                                          </p:stCondLst>
+                                        </p:cTn>
+                                        <p:tgtEl>
+                                          <p:spTgt spid="2"/>
+                                        </p:tgtEl>
+                                        <p:attrNameLst>
+                                          <p:attrName>style.visibility</p:attrName>
+                                        </p:attrNameLst>
+                                      </p:cBhvr>
+                                      <p:to>
+                                        <p:strVal val="visible"/>
+                                      </p:to>
+                                    </p:set>
+                                    <p:animEffect transition="in" filter="fade">
+                                      <p:cBhvr>
+                                        <p:cTn id="7" dur="1000"/>
+                                        <p:tgtEl>
+                                          <p:spTgt spid="2"/>
+                                        </p:tgtEl>
+                                      </p:cBhvr>
+                                    </p:animEffect>
+                                  </p:childTnLst>
+                                </p:cTn>
+                              </p:par>
+                            </p:childTnLst>
+                          </p:cTn>
+                        </p:par>
+                        <p:par>
+                          <p:cTn id="8" fill="hold">
+                            <p:stCondLst>
+                              <p:cond delay="1000"/>
+                            </p:stCondLst>
+                            <p:childTnLst>
+                              <p:par>
+                                <p:cTn id="9" presetID="10" presetClass="entr" presetSubtype="0" fill="hold" grpId="0" nodeType="afterEffect">
+                                  <p:stCondLst>
+                                    <p:cond delay="0"/>
+                                  </p:stCondLst>
+                                  <p:childTnLst>
+                                    <p:set>
+                                      <p:cBhvr>
+                                        <p:cTn id="10" dur="1" fill="hold">
+                                          <p:stCondLst>
+                                            <p:cond delay="0"/>
+                                          </p:stCondLst>
+                                        </p:cTn>
+                                        <p:tgtEl>
+                                          <p:spTgt spid="10"/>
+                                        </p:tgtEl>
+                                        <p:attrNameLst>
+                                          <p:attrName>style.visibility</p:attrName>
+                                        </p:attrNameLst>
+                                      </p:cBhvr>
+                                      <p:to>
+                                        <p:strVal val="visible"/>
+                                      </p:to>
+                                    </p:set>
+                                    <p:animEffect transition="in" filter="fade">
+                                      <p:cBhvr>
+                                        <p:cTn id="11" dur="1000"/>
+                                        <p:tgtEl>
+                                          <p:spTgt spid="10"/>
+                                        </p:tgtEl>
+                                      </p:cBhvr>
+                                    </p:animEffect>
+                                  </p:childTnLst>
+                                </p:cTn>
+                              </p:par>
+                            </p:childTnLst>
+                          </p:cTn>
+                        </p:par>
+                      </p:childTnLst>
+                    </p:cTn>
+                  </p:par>
+                </p:childTnLst>
+              </p:cTn>
+              <p:prevCondLst>
+                <p:cond evt="onPrev" delay="0">
+                  <p:tgtEl>
+                    <p:sldTgt/>
+                  </p:tgtEl>
+                </p:cond>
+              </p:prevCondLst>
+              <p:nextCondLst>
+                <p:cond evt="onNext" delay="0">
+                  <p:tgtEl>
+                    <p:sldTgt/>
+                  </p:tgtEl>
+                </p:cond>
+              </p:nextCondLst>
+            </p:seq>
+          </p:childTnLst>
+        </p:cTn>
       </p:par>
     </p:tnLst>
+    <p:bldLst>
+      <p:bldP spid="10" grpId="0"/>
+      <p:bldP spid="2" grpId="0"/>
+    </p:bldLst>
   </p:timing>
 </p:sld>
 </file>

</xml_diff>